<commit_message>
fixup #2, fix #1 - #2, https://github.com/usagi/rust-memory-container-cs/issues/2#issuecomment-678677444 - #1, tune the contrast and make script for generate variants automatic
</commit_message>
<xml_diff>
--- a/rust-memory-container-cs.pptx
+++ b/rust-memory-container-cs.pptx
@@ -3269,10 +3269,10 @@
       </p:grpSpPr>
       <p:sp>
         <p:nvSpPr>
-          <p:cNvPr id="745" name="テキスト ボックス 744">
-            <a:extLst>
-              <a:ext uri="{FF2B5EF4-FFF2-40B4-BE49-F238E27FC236}">
-                <a16:creationId xmlns:a16="http://schemas.microsoft.com/office/drawing/2014/main" id="{0DBD188F-12D9-49FE-A55D-987605208C8A}"/>
+          <p:cNvPr id="315" name="テキスト ボックス 314">
+            <a:extLst>
+              <a:ext uri="{FF2B5EF4-FFF2-40B4-BE49-F238E27FC236}">
+                <a16:creationId xmlns:a16="http://schemas.microsoft.com/office/drawing/2014/main" id="{203C443B-0C4C-4DF2-A204-58E594702A3A}"/>
               </a:ext>
             </a:extLst>
           </p:cNvPr>
@@ -3281,13 +3281,12 @@
         </p:nvSpPr>
         <p:spPr>
           <a:xfrm>
-            <a:off x="156696" y="6237550"/>
-            <a:ext cx="2909771" cy="400110"/>
+            <a:off x="8561044" y="343912"/>
+            <a:ext cx="1082348" cy="369332"/>
           </a:xfrm>
           <a:prstGeom prst="rect">
             <a:avLst/>
           </a:prstGeom>
-          <a:noFill/>
         </p:spPr>
         <p:txBody>
           <a:bodyPr wrap="none" rtlCol="0">
@@ -3296,36 +3295,43 @@
           <a:lstStyle/>
           <a:p>
             <a:r>
-              <a:rPr kumimoji="1" lang="en-US" altLang="ja-JP" sz="1000">
-                <a:solidFill>
-                  <a:schemeClr val="bg2">
-                    <a:lumMod val="50000"/>
-                  </a:schemeClr>
-                </a:solidFill>
-              </a:rPr>
-              <a:t>rev.1; 2020-08-22</a:t>
-            </a:r>
-          </a:p>
-          <a:p>
-            <a:r>
-              <a:rPr kumimoji="1" lang="en-US" altLang="ja-JP" sz="1000">
-                <a:solidFill>
-                  <a:schemeClr val="bg2">
-                    <a:lumMod val="50000"/>
-                  </a:schemeClr>
-                </a:solidFill>
-              </a:rPr>
-              <a:t>https://github.com/usagi/rust-memory-container-cs</a:t>
-            </a:r>
-          </a:p>
-        </p:txBody>
-      </p:sp>
-      <p:sp>
-        <p:nvSpPr>
-          <p:cNvPr id="4" name="テキスト ボックス 3">
-            <a:extLst>
-              <a:ext uri="{FF2B5EF4-FFF2-40B4-BE49-F238E27FC236}">
-                <a16:creationId xmlns:a16="http://schemas.microsoft.com/office/drawing/2014/main" id="{864CC6FD-7D78-41B2-B6C9-ACF654D2EAF5}"/>
+              <a:rPr lang="en-US" altLang="ja-JP">
+                <a:solidFill>
+                  <a:schemeClr val="accent4"/>
+                </a:solidFill>
+              </a:rPr>
+              <a:t>&lt;mut&gt;</a:t>
+            </a:r>
+            <a:r>
+              <a:rPr kumimoji="1" lang="en-US" altLang="ja-JP" baseline="30000">
+                <a:solidFill>
+                  <a:schemeClr val="accent4"/>
+                </a:solidFill>
+              </a:rPr>
+              <a:t> </a:t>
+            </a:r>
+            <a:r>
+              <a:rPr kumimoji="1" lang="en-US" altLang="ja-JP" baseline="30000">
+                <a:solidFill>
+                  <a:srgbClr val="818181"/>
+                </a:solidFill>
+              </a:rPr>
+              <a:t>(†1)</a:t>
+            </a:r>
+            <a:endParaRPr kumimoji="1" lang="ja-JP" altLang="en-US">
+              <a:solidFill>
+                <a:srgbClr val="818181"/>
+              </a:solidFill>
+            </a:endParaRPr>
+          </a:p>
+        </p:txBody>
+      </p:sp>
+      <p:sp>
+        <p:nvSpPr>
+          <p:cNvPr id="258" name="テキスト ボックス 257">
+            <a:extLst>
+              <a:ext uri="{FF2B5EF4-FFF2-40B4-BE49-F238E27FC236}">
+                <a16:creationId xmlns:a16="http://schemas.microsoft.com/office/drawing/2014/main" id="{C990EF96-3AE4-45F5-88AF-38D34B93A536}"/>
               </a:ext>
             </a:extLst>
           </p:cNvPr>
@@ -3334,13 +3340,12 @@
         </p:nvSpPr>
         <p:spPr>
           <a:xfrm>
-            <a:off x="6123650" y="5876958"/>
-            <a:ext cx="1693990" cy="369332"/>
+            <a:off x="8554621" y="-36144"/>
+            <a:ext cx="1433790" cy="369332"/>
           </a:xfrm>
           <a:prstGeom prst="rect">
             <a:avLst/>
           </a:prstGeom>
-          <a:noFill/>
         </p:spPr>
         <p:txBody>
           <a:bodyPr wrap="none" rtlCol="0">
@@ -3349,14 +3354,14 @@
           <a:lstStyle/>
           <a:p>
             <a:r>
-              <a:rPr kumimoji="1" lang="en-US" altLang="ja-JP">
+              <a:rPr lang="en-US" altLang="ja-JP">
                 <a:solidFill>
                   <a:schemeClr val="bg1">
                     <a:lumMod val="75000"/>
                   </a:schemeClr>
                 </a:solidFill>
               </a:rPr>
-              <a:t>&lt;reader/writer&gt;</a:t>
+              <a:t>&lt;immutable&gt;</a:t>
             </a:r>
             <a:endParaRPr kumimoji="1" lang="ja-JP" altLang="en-US">
               <a:solidFill>
@@ -3370,6 +3375,103 @@
       </p:sp>
       <p:sp>
         <p:nvSpPr>
+          <p:cNvPr id="745" name="テキスト ボックス 744">
+            <a:extLst>
+              <a:ext uri="{FF2B5EF4-FFF2-40B4-BE49-F238E27FC236}">
+                <a16:creationId xmlns:a16="http://schemas.microsoft.com/office/drawing/2014/main" id="{0DBD188F-12D9-49FE-A55D-987605208C8A}"/>
+              </a:ext>
+            </a:extLst>
+          </p:cNvPr>
+          <p:cNvSpPr txBox="1"/>
+          <p:nvPr/>
+        </p:nvSpPr>
+        <p:spPr>
+          <a:xfrm>
+            <a:off x="156696" y="6237550"/>
+            <a:ext cx="2909771" cy="400110"/>
+          </a:xfrm>
+          <a:prstGeom prst="rect">
+            <a:avLst/>
+          </a:prstGeom>
+          <a:noFill/>
+        </p:spPr>
+        <p:txBody>
+          <a:bodyPr wrap="none" rtlCol="0">
+            <a:spAutoFit/>
+          </a:bodyPr>
+          <a:lstStyle/>
+          <a:p>
+            <a:r>
+              <a:rPr kumimoji="1" lang="en-US" altLang="ja-JP" sz="1000">
+                <a:solidFill>
+                  <a:srgbClr val="818181"/>
+                </a:solidFill>
+              </a:rPr>
+              <a:t>rev.1; 2020-08-22</a:t>
+            </a:r>
+          </a:p>
+          <a:p>
+            <a:r>
+              <a:rPr kumimoji="1" lang="en-US" altLang="ja-JP" sz="1000">
+                <a:solidFill>
+                  <a:srgbClr val="818181"/>
+                </a:solidFill>
+              </a:rPr>
+              <a:t>https://github.com/usagi/rust-memory-container-cs</a:t>
+            </a:r>
+          </a:p>
+        </p:txBody>
+      </p:sp>
+      <p:sp>
+        <p:nvSpPr>
+          <p:cNvPr id="4" name="テキスト ボックス 3">
+            <a:extLst>
+              <a:ext uri="{FF2B5EF4-FFF2-40B4-BE49-F238E27FC236}">
+                <a16:creationId xmlns:a16="http://schemas.microsoft.com/office/drawing/2014/main" id="{864CC6FD-7D78-41B2-B6C9-ACF654D2EAF5}"/>
+              </a:ext>
+            </a:extLst>
+          </p:cNvPr>
+          <p:cNvSpPr txBox="1"/>
+          <p:nvPr/>
+        </p:nvSpPr>
+        <p:spPr>
+          <a:xfrm>
+            <a:off x="5963375" y="5876958"/>
+            <a:ext cx="1693990" cy="369332"/>
+          </a:xfrm>
+          <a:prstGeom prst="rect">
+            <a:avLst/>
+          </a:prstGeom>
+          <a:noFill/>
+        </p:spPr>
+        <p:txBody>
+          <a:bodyPr wrap="none" rtlCol="0">
+            <a:spAutoFit/>
+          </a:bodyPr>
+          <a:lstStyle/>
+          <a:p>
+            <a:r>
+              <a:rPr kumimoji="1" lang="en-US" altLang="ja-JP">
+                <a:solidFill>
+                  <a:schemeClr val="bg1">
+                    <a:lumMod val="75000"/>
+                  </a:schemeClr>
+                </a:solidFill>
+              </a:rPr>
+              <a:t>&lt;reader/writer&gt;</a:t>
+            </a:r>
+            <a:endParaRPr kumimoji="1" lang="ja-JP" altLang="en-US">
+              <a:solidFill>
+                <a:schemeClr val="bg1">
+                  <a:lumMod val="75000"/>
+                </a:schemeClr>
+              </a:solidFill>
+            </a:endParaRPr>
+          </a:p>
+        </p:txBody>
+      </p:sp>
+      <p:sp>
+        <p:nvSpPr>
           <p:cNvPr id="5" name="テキスト ボックス 4">
             <a:extLst>
               <a:ext uri="{FF2B5EF4-FFF2-40B4-BE49-F238E27FC236}">
@@ -3382,8 +3484,8 @@
         </p:nvSpPr>
         <p:spPr>
           <a:xfrm>
-            <a:off x="10251332" y="1360700"/>
-            <a:ext cx="2070573" cy="369332"/>
+            <a:off x="9966418" y="1360700"/>
+            <a:ext cx="2090179" cy="369332"/>
           </a:xfrm>
           <a:prstGeom prst="rect">
             <a:avLst/>
@@ -3409,9 +3511,7 @@
             <a:r>
               <a:rPr kumimoji="1" lang="en-US" altLang="ja-JP">
                 <a:solidFill>
-                  <a:schemeClr val="bg2">
-                    <a:lumMod val="50000"/>
-                  </a:schemeClr>
+                  <a:srgbClr val="818181"/>
                 </a:solidFill>
               </a:rPr>
               <a:t>or</a:t>
@@ -3437,12 +3537,260 @@
             <a:r>
               <a:rPr kumimoji="1" lang="en-US" altLang="ja-JP" baseline="30000">
                 <a:solidFill>
-                  <a:schemeClr val="bg2">
-                    <a:lumMod val="50000"/>
+                  <a:srgbClr val="818181"/>
+                </a:solidFill>
+              </a:rPr>
+              <a:t>(†1)</a:t>
+            </a:r>
+            <a:endParaRPr kumimoji="1" lang="ja-JP" altLang="en-US">
+              <a:solidFill>
+                <a:srgbClr val="818181"/>
+              </a:solidFill>
+            </a:endParaRPr>
+          </a:p>
+        </p:txBody>
+      </p:sp>
+      <p:sp>
+        <p:nvSpPr>
+          <p:cNvPr id="7" name="テキスト ボックス 6">
+            <a:extLst>
+              <a:ext uri="{FF2B5EF4-FFF2-40B4-BE49-F238E27FC236}">
+                <a16:creationId xmlns:a16="http://schemas.microsoft.com/office/drawing/2014/main" id="{1B7E1512-4088-4835-9D73-465EEA1B994A}"/>
+              </a:ext>
+            </a:extLst>
+          </p:cNvPr>
+          <p:cNvSpPr txBox="1"/>
+          <p:nvPr/>
+        </p:nvSpPr>
+        <p:spPr>
+          <a:xfrm>
+            <a:off x="9966418" y="1709928"/>
+            <a:ext cx="2090179" cy="369332"/>
+          </a:xfrm>
+          <a:prstGeom prst="rect">
+            <a:avLst/>
+          </a:prstGeom>
+          <a:noFill/>
+        </p:spPr>
+        <p:txBody>
+          <a:bodyPr wrap="square" rtlCol="0">
+            <a:spAutoFit/>
+          </a:bodyPr>
+          <a:lstStyle/>
+          <a:p>
+            <a:r>
+              <a:rPr kumimoji="1" lang="en-US" altLang="ja-JP">
+                <a:solidFill>
+                  <a:srgbClr val="00B0F0"/>
+                </a:solidFill>
+              </a:rPr>
+              <a:t>Cell&lt;</a:t>
+            </a:r>
+            <a:r>
+              <a:rPr kumimoji="1" lang="en-US" altLang="ja-JP">
+                <a:solidFill>
+                  <a:schemeClr val="accent4"/>
+                </a:solidFill>
+              </a:rPr>
+              <a:t>T</a:t>
+            </a:r>
+            <a:r>
+              <a:rPr kumimoji="1" lang="en-US" altLang="ja-JP">
+                <a:solidFill>
+                  <a:srgbClr val="00B0F0"/>
+                </a:solidFill>
+              </a:rPr>
+              <a:t>&gt;</a:t>
+            </a:r>
+            <a:endParaRPr kumimoji="1" lang="ja-JP" altLang="en-US">
+              <a:solidFill>
+                <a:srgbClr val="00B0F0"/>
+              </a:solidFill>
+            </a:endParaRPr>
+          </a:p>
+        </p:txBody>
+      </p:sp>
+      <p:sp>
+        <p:nvSpPr>
+          <p:cNvPr id="9" name="テキスト ボックス 8">
+            <a:extLst>
+              <a:ext uri="{FF2B5EF4-FFF2-40B4-BE49-F238E27FC236}">
+                <a16:creationId xmlns:a16="http://schemas.microsoft.com/office/drawing/2014/main" id="{2EF291D3-C527-4341-A352-CF2205CA6393}"/>
+              </a:ext>
+            </a:extLst>
+          </p:cNvPr>
+          <p:cNvSpPr txBox="1"/>
+          <p:nvPr/>
+        </p:nvSpPr>
+        <p:spPr>
+          <a:xfrm>
+            <a:off x="9966418" y="2103120"/>
+            <a:ext cx="2090179" cy="369332"/>
+          </a:xfrm>
+          <a:prstGeom prst="rect">
+            <a:avLst/>
+          </a:prstGeom>
+          <a:noFill/>
+        </p:spPr>
+        <p:txBody>
+          <a:bodyPr wrap="square" rtlCol="0">
+            <a:spAutoFit/>
+          </a:bodyPr>
+          <a:lstStyle/>
+          <a:p>
+            <a:r>
+              <a:rPr kumimoji="1" lang="en-US" altLang="ja-JP" err="1">
+                <a:solidFill>
+                  <a:srgbClr val="00B0F0"/>
+                </a:solidFill>
+              </a:rPr>
+              <a:t>RefCell</a:t>
+            </a:r>
+            <a:r>
+              <a:rPr kumimoji="1" lang="en-US" altLang="ja-JP">
+                <a:solidFill>
+                  <a:srgbClr val="00B0F0"/>
+                </a:solidFill>
+              </a:rPr>
+              <a:t>&lt;</a:t>
+            </a:r>
+            <a:r>
+              <a:rPr kumimoji="1" lang="en-US" altLang="ja-JP">
+                <a:solidFill>
+                  <a:schemeClr val="accent4"/>
+                </a:solidFill>
+              </a:rPr>
+              <a:t>T</a:t>
+            </a:r>
+            <a:r>
+              <a:rPr kumimoji="1" lang="en-US" altLang="ja-JP">
+                <a:solidFill>
+                  <a:srgbClr val="00B0F0"/>
+                </a:solidFill>
+              </a:rPr>
+              <a:t>&gt;</a:t>
+            </a:r>
+            <a:endParaRPr kumimoji="1" lang="ja-JP" altLang="en-US">
+              <a:solidFill>
+                <a:srgbClr val="00B0F0"/>
+              </a:solidFill>
+            </a:endParaRPr>
+          </a:p>
+        </p:txBody>
+      </p:sp>
+      <p:sp>
+        <p:nvSpPr>
+          <p:cNvPr id="13" name="テキスト ボックス 12">
+            <a:extLst>
+              <a:ext uri="{FF2B5EF4-FFF2-40B4-BE49-F238E27FC236}">
+                <a16:creationId xmlns:a16="http://schemas.microsoft.com/office/drawing/2014/main" id="{9CF9D3A6-ED5F-453B-991F-BB7828EF3BCB}"/>
+              </a:ext>
+            </a:extLst>
+          </p:cNvPr>
+          <p:cNvSpPr txBox="1"/>
+          <p:nvPr/>
+        </p:nvSpPr>
+        <p:spPr>
+          <a:xfrm>
+            <a:off x="9966418" y="4054720"/>
+            <a:ext cx="2090179" cy="369332"/>
+          </a:xfrm>
+          <a:prstGeom prst="rect">
+            <a:avLst/>
+          </a:prstGeom>
+          <a:noFill/>
+        </p:spPr>
+        <p:txBody>
+          <a:bodyPr wrap="square" rtlCol="0">
+            <a:spAutoFit/>
+          </a:bodyPr>
+          <a:lstStyle/>
+          <a:p>
+            <a:r>
+              <a:rPr kumimoji="1" lang="en-US" altLang="ja-JP" err="1">
+                <a:solidFill>
+                  <a:schemeClr val="accent4"/>
+                </a:solidFill>
+              </a:rPr>
+              <a:t>AtomicT</a:t>
+            </a:r>
+            <a:r>
+              <a:rPr kumimoji="1" lang="en-US" altLang="ja-JP">
+                <a:solidFill>
+                  <a:schemeClr val="bg1">
+                    <a:lumMod val="75000"/>
                   </a:schemeClr>
                 </a:solidFill>
               </a:rPr>
-              <a:t>(†1)</a:t>
+              <a:t> </a:t>
+            </a:r>
+            <a:r>
+              <a:rPr kumimoji="1" lang="en-US" altLang="ja-JP" baseline="30000">
+                <a:solidFill>
+                  <a:srgbClr val="818181"/>
+                </a:solidFill>
+              </a:rPr>
+              <a:t>(†2)</a:t>
+            </a:r>
+            <a:endParaRPr kumimoji="1" lang="ja-JP" altLang="en-US">
+              <a:solidFill>
+                <a:srgbClr val="818181"/>
+              </a:solidFill>
+            </a:endParaRPr>
+          </a:p>
+        </p:txBody>
+      </p:sp>
+      <p:sp>
+        <p:nvSpPr>
+          <p:cNvPr id="15" name="テキスト ボックス 14">
+            <a:extLst>
+              <a:ext uri="{FF2B5EF4-FFF2-40B4-BE49-F238E27FC236}">
+                <a16:creationId xmlns:a16="http://schemas.microsoft.com/office/drawing/2014/main" id="{7FC94850-BA8D-4BB9-8DA8-CDCDC9BBA588}"/>
+              </a:ext>
+            </a:extLst>
+          </p:cNvPr>
+          <p:cNvSpPr txBox="1"/>
+          <p:nvPr/>
+        </p:nvSpPr>
+        <p:spPr>
+          <a:xfrm>
+            <a:off x="9966418" y="4445500"/>
+            <a:ext cx="2090179" cy="369332"/>
+          </a:xfrm>
+          <a:prstGeom prst="rect">
+            <a:avLst/>
+          </a:prstGeom>
+          <a:noFill/>
+        </p:spPr>
+        <p:txBody>
+          <a:bodyPr wrap="square" rtlCol="0">
+            <a:spAutoFit/>
+          </a:bodyPr>
+          <a:lstStyle/>
+          <a:p>
+            <a:r>
+              <a:rPr kumimoji="1" lang="en-US" altLang="ja-JP">
+                <a:solidFill>
+                  <a:schemeClr val="accent6"/>
+                </a:solidFill>
+              </a:rPr>
+              <a:t>Mutex&lt;</a:t>
+            </a:r>
+            <a:r>
+              <a:rPr kumimoji="1" lang="en-US" altLang="ja-JP">
+                <a:solidFill>
+                  <a:schemeClr val="accent4"/>
+                </a:solidFill>
+              </a:rPr>
+              <a:t>T</a:t>
+            </a:r>
+            <a:r>
+              <a:rPr kumimoji="1" lang="en-US" altLang="ja-JP">
+                <a:solidFill>
+                  <a:schemeClr val="accent6"/>
+                </a:solidFill>
+              </a:rPr>
+              <a:t>&gt;</a:t>
             </a:r>
             <a:endParaRPr kumimoji="1" lang="ja-JP" altLang="en-US">
               <a:solidFill>
@@ -3454,10 +3802,10 @@
       </p:sp>
       <p:sp>
         <p:nvSpPr>
-          <p:cNvPr id="7" name="テキスト ボックス 6">
-            <a:extLst>
-              <a:ext uri="{FF2B5EF4-FFF2-40B4-BE49-F238E27FC236}">
-                <a16:creationId xmlns:a16="http://schemas.microsoft.com/office/drawing/2014/main" id="{1B7E1512-4088-4835-9D73-465EEA1B994A}"/>
+          <p:cNvPr id="17" name="テキスト ボックス 16">
+            <a:extLst>
+              <a:ext uri="{FF2B5EF4-FFF2-40B4-BE49-F238E27FC236}">
+                <a16:creationId xmlns:a16="http://schemas.microsoft.com/office/drawing/2014/main" id="{C3EBBFF7-DAA5-4670-8664-230AF806618B}"/>
               </a:ext>
             </a:extLst>
           </p:cNvPr>
@@ -3466,8 +3814,8 @@
         </p:nvSpPr>
         <p:spPr>
           <a:xfrm>
-            <a:off x="10251332" y="2100820"/>
-            <a:ext cx="2070573" cy="369332"/>
+            <a:off x="9966418" y="4836280"/>
+            <a:ext cx="2090179" cy="369332"/>
           </a:xfrm>
           <a:prstGeom prst="rect">
             <a:avLst/>
@@ -3481,17 +3829,95 @@
           <a:lstStyle/>
           <a:p>
             <a:r>
+              <a:rPr kumimoji="1" lang="en-US" altLang="ja-JP" err="1">
+                <a:solidFill>
+                  <a:schemeClr val="accent6"/>
+                </a:solidFill>
+              </a:rPr>
+              <a:t>RwLock</a:t>
+            </a:r>
+            <a:r>
               <a:rPr kumimoji="1" lang="en-US" altLang="ja-JP">
                 <a:solidFill>
+                  <a:schemeClr val="accent6"/>
+                </a:solidFill>
+              </a:rPr>
+              <a:t>&lt;</a:t>
+            </a:r>
+            <a:r>
+              <a:rPr kumimoji="1" lang="en-US" altLang="ja-JP">
+                <a:solidFill>
+                  <a:schemeClr val="accent4"/>
+                </a:solidFill>
+              </a:rPr>
+              <a:t>T</a:t>
+            </a:r>
+            <a:r>
+              <a:rPr kumimoji="1" lang="en-US" altLang="ja-JP">
+                <a:solidFill>
+                  <a:schemeClr val="accent6"/>
+                </a:solidFill>
+              </a:rPr>
+              <a:t>&gt;</a:t>
+            </a:r>
+            <a:endParaRPr kumimoji="1" lang="ja-JP" altLang="en-US">
+              <a:solidFill>
+                <a:schemeClr val="accent6"/>
+              </a:solidFill>
+            </a:endParaRPr>
+          </a:p>
+        </p:txBody>
+      </p:sp>
+      <p:sp>
+        <p:nvSpPr>
+          <p:cNvPr id="19" name="テキスト ボックス 18">
+            <a:extLst>
+              <a:ext uri="{FF2B5EF4-FFF2-40B4-BE49-F238E27FC236}">
+                <a16:creationId xmlns:a16="http://schemas.microsoft.com/office/drawing/2014/main" id="{6ED28D9D-D16D-43B8-B0BA-F7FE63A980FA}"/>
+              </a:ext>
+            </a:extLst>
+          </p:cNvPr>
+          <p:cNvSpPr txBox="1"/>
+          <p:nvPr/>
+        </p:nvSpPr>
+        <p:spPr>
+          <a:xfrm>
+            <a:off x="9966418" y="2882380"/>
+            <a:ext cx="2090179" cy="369332"/>
+          </a:xfrm>
+          <a:prstGeom prst="rect">
+            <a:avLst/>
+          </a:prstGeom>
+          <a:noFill/>
+        </p:spPr>
+        <p:txBody>
+          <a:bodyPr wrap="square" rtlCol="0">
+            <a:spAutoFit/>
+          </a:bodyPr>
+          <a:lstStyle/>
+          <a:p>
+            <a:r>
+              <a:rPr kumimoji="1" lang="en-US" altLang="ja-JP" err="1">
+                <a:solidFill>
                   <a:srgbClr val="00B0F0"/>
                 </a:solidFill>
               </a:rPr>
-              <a:t>Cell&lt;</a:t>
+              <a:t>Rc</a:t>
             </a:r>
             <a:r>
               <a:rPr kumimoji="1" lang="en-US" altLang="ja-JP">
                 <a:solidFill>
-                  <a:schemeClr val="accent4"/>
+                  <a:srgbClr val="00B0F0"/>
+                </a:solidFill>
+              </a:rPr>
+              <a:t>&lt;</a:t>
+            </a:r>
+            <a:r>
+              <a:rPr kumimoji="1" lang="en-US" altLang="ja-JP">
+                <a:solidFill>
+                  <a:schemeClr val="bg1">
+                    <a:lumMod val="75000"/>
+                  </a:schemeClr>
                 </a:solidFill>
               </a:rPr>
               <a:t>T</a:t>
@@ -3514,10 +3940,10 @@
       </p:sp>
       <p:sp>
         <p:nvSpPr>
-          <p:cNvPr id="9" name="テキスト ボックス 8">
-            <a:extLst>
-              <a:ext uri="{FF2B5EF4-FFF2-40B4-BE49-F238E27FC236}">
-                <a16:creationId xmlns:a16="http://schemas.microsoft.com/office/drawing/2014/main" id="{2EF291D3-C527-4341-A352-CF2205CA6393}"/>
+          <p:cNvPr id="21" name="テキスト ボックス 20">
+            <a:extLst>
+              <a:ext uri="{FF2B5EF4-FFF2-40B4-BE49-F238E27FC236}">
+                <a16:creationId xmlns:a16="http://schemas.microsoft.com/office/drawing/2014/main" id="{59A3CC70-B70E-4C02-856E-30F4E06B4BD3}"/>
               </a:ext>
             </a:extLst>
           </p:cNvPr>
@@ -3526,8 +3952,8 @@
         </p:nvSpPr>
         <p:spPr>
           <a:xfrm>
-            <a:off x="10251332" y="2491600"/>
-            <a:ext cx="2070573" cy="369332"/>
+            <a:off x="9966418" y="3273160"/>
+            <a:ext cx="2090179" cy="369332"/>
           </a:xfrm>
           <a:prstGeom prst="rect">
             <a:avLst/>
@@ -3546,7 +3972,7 @@
                   <a:srgbClr val="00B0F0"/>
                 </a:solidFill>
               </a:rPr>
-              <a:t>RefCell</a:t>
+              <a:t>Rc</a:t>
             </a:r>
             <a:r>
               <a:rPr kumimoji="1" lang="en-US" altLang="ja-JP">
@@ -3554,7 +3980,7 @@
                   <a:srgbClr val="00B0F0"/>
                 </a:solidFill>
               </a:rPr>
-              <a:t>&lt;</a:t>
+              <a:t>&lt;Cell&lt;</a:t>
             </a:r>
             <a:r>
               <a:rPr kumimoji="1" lang="en-US" altLang="ja-JP">
@@ -3570,7 +3996,7 @@
                   <a:srgbClr val="00B0F0"/>
                 </a:solidFill>
               </a:rPr>
-              <a:t>&gt;</a:t>
+              <a:t>&gt;&gt;</a:t>
             </a:r>
             <a:endParaRPr kumimoji="1" lang="ja-JP" altLang="en-US">
               <a:solidFill>
@@ -3582,10 +4008,10 @@
       </p:sp>
       <p:sp>
         <p:nvSpPr>
-          <p:cNvPr id="13" name="テキスト ボックス 12">
-            <a:extLst>
-              <a:ext uri="{FF2B5EF4-FFF2-40B4-BE49-F238E27FC236}">
-                <a16:creationId xmlns:a16="http://schemas.microsoft.com/office/drawing/2014/main" id="{9CF9D3A6-ED5F-453B-991F-BB7828EF3BCB}"/>
+          <p:cNvPr id="23" name="テキスト ボックス 22">
+            <a:extLst>
+              <a:ext uri="{FF2B5EF4-FFF2-40B4-BE49-F238E27FC236}">
+                <a16:creationId xmlns:a16="http://schemas.microsoft.com/office/drawing/2014/main" id="{B34634D4-E6E5-4598-8416-1DA736BFC335}"/>
               </a:ext>
             </a:extLst>
           </p:cNvPr>
@@ -3594,8 +4020,8 @@
         </p:nvSpPr>
         <p:spPr>
           <a:xfrm>
-            <a:off x="10251332" y="4054720"/>
-            <a:ext cx="2070573" cy="369332"/>
+            <a:off x="9966418" y="3663940"/>
+            <a:ext cx="2090179" cy="369332"/>
           </a:xfrm>
           <a:prstGeom prst="rect">
             <a:avLst/>
@@ -3611,10 +4037,94 @@
             <a:r>
               <a:rPr kumimoji="1" lang="en-US" altLang="ja-JP" err="1">
                 <a:solidFill>
+                  <a:srgbClr val="00B0F0"/>
+                </a:solidFill>
+              </a:rPr>
+              <a:t>Rc</a:t>
+            </a:r>
+            <a:r>
+              <a:rPr kumimoji="1" lang="en-US" altLang="ja-JP">
+                <a:solidFill>
+                  <a:srgbClr val="00B0F0"/>
+                </a:solidFill>
+              </a:rPr>
+              <a:t>&lt;</a:t>
+            </a:r>
+            <a:r>
+              <a:rPr kumimoji="1" lang="en-US" altLang="ja-JP" err="1">
+                <a:solidFill>
+                  <a:srgbClr val="00B0F0"/>
+                </a:solidFill>
+              </a:rPr>
+              <a:t>RefCell</a:t>
+            </a:r>
+            <a:r>
+              <a:rPr kumimoji="1" lang="en-US" altLang="ja-JP">
+                <a:solidFill>
+                  <a:srgbClr val="00B0F0"/>
+                </a:solidFill>
+              </a:rPr>
+              <a:t>&lt;</a:t>
+            </a:r>
+            <a:r>
+              <a:rPr kumimoji="1" lang="en-US" altLang="ja-JP">
+                <a:solidFill>
                   <a:schemeClr val="accent4"/>
                 </a:solidFill>
               </a:rPr>
-              <a:t>AtomicT</a:t>
+              <a:t>T</a:t>
+            </a:r>
+            <a:r>
+              <a:rPr kumimoji="1" lang="en-US" altLang="ja-JP">
+                <a:solidFill>
+                  <a:srgbClr val="00B0F0"/>
+                </a:solidFill>
+              </a:rPr>
+              <a:t>&gt;&gt;</a:t>
+            </a:r>
+            <a:endParaRPr kumimoji="1" lang="ja-JP" altLang="en-US">
+              <a:solidFill>
+                <a:srgbClr val="00B0F0"/>
+              </a:solidFill>
+            </a:endParaRPr>
+          </a:p>
+        </p:txBody>
+      </p:sp>
+      <p:sp>
+        <p:nvSpPr>
+          <p:cNvPr id="25" name="テキスト ボックス 24">
+            <a:extLst>
+              <a:ext uri="{FF2B5EF4-FFF2-40B4-BE49-F238E27FC236}">
+                <a16:creationId xmlns:a16="http://schemas.microsoft.com/office/drawing/2014/main" id="{080D8927-B900-4E19-A9CB-C092D81DFB69}"/>
+              </a:ext>
+            </a:extLst>
+          </p:cNvPr>
+          <p:cNvSpPr txBox="1"/>
+          <p:nvPr/>
+        </p:nvSpPr>
+        <p:spPr>
+          <a:xfrm>
+            <a:off x="9966418" y="5227060"/>
+            <a:ext cx="2090179" cy="369332"/>
+          </a:xfrm>
+          <a:prstGeom prst="rect">
+            <a:avLst/>
+          </a:prstGeom>
+          <a:noFill/>
+        </p:spPr>
+        <p:txBody>
+          <a:bodyPr wrap="square" rtlCol="0">
+            <a:spAutoFit/>
+          </a:bodyPr>
+          <a:lstStyle/>
+          <a:p>
+            <a:r>
+              <a:rPr kumimoji="1" lang="en-US" altLang="ja-JP">
+                <a:solidFill>
+                  <a:schemeClr val="accent6"/>
+                </a:solidFill>
+              </a:rPr>
+              <a:t>Arc&lt;</a:t>
             </a:r>
             <a:r>
               <a:rPr kumimoji="1" lang="en-US" altLang="ja-JP">
@@ -3624,17 +4134,15 @@
                   </a:schemeClr>
                 </a:solidFill>
               </a:rPr>
-              <a:t> </a:t>
-            </a:r>
-            <a:r>
-              <a:rPr kumimoji="1" lang="en-US" altLang="ja-JP" baseline="30000">
-                <a:solidFill>
-                  <a:schemeClr val="bg2">
-                    <a:lumMod val="50000"/>
-                  </a:schemeClr>
-                </a:solidFill>
-              </a:rPr>
-              <a:t>(†2)</a:t>
+              <a:t>T</a:t>
+            </a:r>
+            <a:r>
+              <a:rPr kumimoji="1" lang="en-US" altLang="ja-JP">
+                <a:solidFill>
+                  <a:schemeClr val="accent6"/>
+                </a:solidFill>
+              </a:rPr>
+              <a:t>&gt;</a:t>
             </a:r>
             <a:endParaRPr kumimoji="1" lang="ja-JP" altLang="en-US">
               <a:solidFill>
@@ -3646,10 +4154,10 @@
       </p:sp>
       <p:sp>
         <p:nvSpPr>
-          <p:cNvPr id="15" name="テキスト ボックス 14">
-            <a:extLst>
-              <a:ext uri="{FF2B5EF4-FFF2-40B4-BE49-F238E27FC236}">
-                <a16:creationId xmlns:a16="http://schemas.microsoft.com/office/drawing/2014/main" id="{7FC94850-BA8D-4BB9-8DA8-CDCDC9BBA588}"/>
+          <p:cNvPr id="27" name="テキスト ボックス 26">
+            <a:extLst>
+              <a:ext uri="{FF2B5EF4-FFF2-40B4-BE49-F238E27FC236}">
+                <a16:creationId xmlns:a16="http://schemas.microsoft.com/office/drawing/2014/main" id="{E3FEF7C4-BBFC-4978-8BD4-60B7C5AE4C0B}"/>
               </a:ext>
             </a:extLst>
           </p:cNvPr>
@@ -3658,8 +4166,8 @@
         </p:nvSpPr>
         <p:spPr>
           <a:xfrm>
-            <a:off x="10251332" y="4445500"/>
-            <a:ext cx="2070573" cy="369332"/>
+            <a:off x="9966418" y="6008620"/>
+            <a:ext cx="2090179" cy="369332"/>
           </a:xfrm>
           <a:prstGeom prst="rect">
             <a:avLst/>
@@ -3678,7 +4186,7 @@
                   <a:schemeClr val="accent6"/>
                 </a:solidFill>
               </a:rPr>
-              <a:t>Mutex&lt;</a:t>
+              <a:t>Arc&lt;Mutex&lt;</a:t>
             </a:r>
             <a:r>
               <a:rPr kumimoji="1" lang="en-US" altLang="ja-JP">
@@ -3694,7 +4202,7 @@
                   <a:schemeClr val="accent6"/>
                 </a:solidFill>
               </a:rPr>
-              <a:t>&gt;</a:t>
+              <a:t>&gt;&gt;</a:t>
             </a:r>
             <a:endParaRPr kumimoji="1" lang="ja-JP" altLang="en-US">
               <a:solidFill>
@@ -3706,10 +4214,10 @@
       </p:sp>
       <p:sp>
         <p:nvSpPr>
-          <p:cNvPr id="17" name="テキスト ボックス 16">
-            <a:extLst>
-              <a:ext uri="{FF2B5EF4-FFF2-40B4-BE49-F238E27FC236}">
-                <a16:creationId xmlns:a16="http://schemas.microsoft.com/office/drawing/2014/main" id="{C3EBBFF7-DAA5-4670-8664-230AF806618B}"/>
+          <p:cNvPr id="29" name="テキスト ボックス 28">
+            <a:extLst>
+              <a:ext uri="{FF2B5EF4-FFF2-40B4-BE49-F238E27FC236}">
+                <a16:creationId xmlns:a16="http://schemas.microsoft.com/office/drawing/2014/main" id="{CFFF48BE-642E-43A6-B8F4-449503B354CC}"/>
               </a:ext>
             </a:extLst>
           </p:cNvPr>
@@ -3718,8 +4226,8 @@
         </p:nvSpPr>
         <p:spPr>
           <a:xfrm>
-            <a:off x="10251332" y="4836280"/>
-            <a:ext cx="2070573" cy="369332"/>
+            <a:off x="9966418" y="6399400"/>
+            <a:ext cx="2090179" cy="369332"/>
           </a:xfrm>
           <a:prstGeom prst="rect">
             <a:avLst/>
@@ -3733,6 +4241,14 @@
           <a:lstStyle/>
           <a:p>
             <a:r>
+              <a:rPr kumimoji="1" lang="en-US" altLang="ja-JP">
+                <a:solidFill>
+                  <a:schemeClr val="accent6"/>
+                </a:solidFill>
+              </a:rPr>
+              <a:t>Arc&lt;</a:t>
+            </a:r>
+            <a:r>
               <a:rPr kumimoji="1" lang="en-US" altLang="ja-JP" err="1">
                 <a:solidFill>
                   <a:schemeClr val="accent6"/>
@@ -3762,7 +4278,7 @@
                   <a:schemeClr val="accent6"/>
                 </a:solidFill>
               </a:rPr>
-              <a:t>&gt;</a:t>
+              <a:t>&gt;&gt;</a:t>
             </a:r>
             <a:endParaRPr kumimoji="1" lang="ja-JP" altLang="en-US">
               <a:solidFill>
@@ -3774,10 +4290,10 @@
       </p:sp>
       <p:sp>
         <p:nvSpPr>
-          <p:cNvPr id="19" name="テキスト ボックス 18">
-            <a:extLst>
-              <a:ext uri="{FF2B5EF4-FFF2-40B4-BE49-F238E27FC236}">
-                <a16:creationId xmlns:a16="http://schemas.microsoft.com/office/drawing/2014/main" id="{6ED28D9D-D16D-43B8-B0BA-F7FE63A980FA}"/>
+          <p:cNvPr id="31" name="テキスト ボックス 30">
+            <a:extLst>
+              <a:ext uri="{FF2B5EF4-FFF2-40B4-BE49-F238E27FC236}">
+                <a16:creationId xmlns:a16="http://schemas.microsoft.com/office/drawing/2014/main" id="{DFBCD7E6-BC37-400D-9A06-5DD5234F7D3D}"/>
               </a:ext>
             </a:extLst>
           </p:cNvPr>
@@ -3786,427 +4302,7 @@
         </p:nvSpPr>
         <p:spPr>
           <a:xfrm>
-            <a:off x="10251332" y="2882380"/>
-            <a:ext cx="2070573" cy="369332"/>
-          </a:xfrm>
-          <a:prstGeom prst="rect">
-            <a:avLst/>
-          </a:prstGeom>
-          <a:noFill/>
-        </p:spPr>
-        <p:txBody>
-          <a:bodyPr wrap="square" rtlCol="0">
-            <a:spAutoFit/>
-          </a:bodyPr>
-          <a:lstStyle/>
-          <a:p>
-            <a:r>
-              <a:rPr kumimoji="1" lang="en-US" altLang="ja-JP" err="1">
-                <a:solidFill>
-                  <a:srgbClr val="00B0F0"/>
-                </a:solidFill>
-              </a:rPr>
-              <a:t>Rc</a:t>
-            </a:r>
-            <a:r>
-              <a:rPr kumimoji="1" lang="en-US" altLang="ja-JP">
-                <a:solidFill>
-                  <a:srgbClr val="00B0F0"/>
-                </a:solidFill>
-              </a:rPr>
-              <a:t>&lt;</a:t>
-            </a:r>
-            <a:r>
-              <a:rPr kumimoji="1" lang="en-US" altLang="ja-JP">
-                <a:solidFill>
-                  <a:schemeClr val="bg1">
-                    <a:lumMod val="75000"/>
-                  </a:schemeClr>
-                </a:solidFill>
-              </a:rPr>
-              <a:t>T</a:t>
-            </a:r>
-            <a:r>
-              <a:rPr kumimoji="1" lang="en-US" altLang="ja-JP">
-                <a:solidFill>
-                  <a:srgbClr val="00B0F0"/>
-                </a:solidFill>
-              </a:rPr>
-              <a:t>&gt;</a:t>
-            </a:r>
-            <a:endParaRPr kumimoji="1" lang="ja-JP" altLang="en-US">
-              <a:solidFill>
-                <a:srgbClr val="00B0F0"/>
-              </a:solidFill>
-            </a:endParaRPr>
-          </a:p>
-        </p:txBody>
-      </p:sp>
-      <p:sp>
-        <p:nvSpPr>
-          <p:cNvPr id="21" name="テキスト ボックス 20">
-            <a:extLst>
-              <a:ext uri="{FF2B5EF4-FFF2-40B4-BE49-F238E27FC236}">
-                <a16:creationId xmlns:a16="http://schemas.microsoft.com/office/drawing/2014/main" id="{59A3CC70-B70E-4C02-856E-30F4E06B4BD3}"/>
-              </a:ext>
-            </a:extLst>
-          </p:cNvPr>
-          <p:cNvSpPr txBox="1"/>
-          <p:nvPr/>
-        </p:nvSpPr>
-        <p:spPr>
-          <a:xfrm>
-            <a:off x="10251332" y="3273160"/>
-            <a:ext cx="2070573" cy="369332"/>
-          </a:xfrm>
-          <a:prstGeom prst="rect">
-            <a:avLst/>
-          </a:prstGeom>
-          <a:noFill/>
-        </p:spPr>
-        <p:txBody>
-          <a:bodyPr wrap="square" rtlCol="0">
-            <a:spAutoFit/>
-          </a:bodyPr>
-          <a:lstStyle/>
-          <a:p>
-            <a:r>
-              <a:rPr kumimoji="1" lang="en-US" altLang="ja-JP" err="1">
-                <a:solidFill>
-                  <a:srgbClr val="00B0F0"/>
-                </a:solidFill>
-              </a:rPr>
-              <a:t>Rc</a:t>
-            </a:r>
-            <a:r>
-              <a:rPr kumimoji="1" lang="en-US" altLang="ja-JP">
-                <a:solidFill>
-                  <a:srgbClr val="00B0F0"/>
-                </a:solidFill>
-              </a:rPr>
-              <a:t>&lt;Cell&lt;</a:t>
-            </a:r>
-            <a:r>
-              <a:rPr kumimoji="1" lang="en-US" altLang="ja-JP">
-                <a:solidFill>
-                  <a:schemeClr val="accent4"/>
-                </a:solidFill>
-              </a:rPr>
-              <a:t>T</a:t>
-            </a:r>
-            <a:r>
-              <a:rPr kumimoji="1" lang="en-US" altLang="ja-JP">
-                <a:solidFill>
-                  <a:srgbClr val="00B0F0"/>
-                </a:solidFill>
-              </a:rPr>
-              <a:t>&gt;&gt;</a:t>
-            </a:r>
-            <a:endParaRPr kumimoji="1" lang="ja-JP" altLang="en-US">
-              <a:solidFill>
-                <a:srgbClr val="00B0F0"/>
-              </a:solidFill>
-            </a:endParaRPr>
-          </a:p>
-        </p:txBody>
-      </p:sp>
-      <p:sp>
-        <p:nvSpPr>
-          <p:cNvPr id="23" name="テキスト ボックス 22">
-            <a:extLst>
-              <a:ext uri="{FF2B5EF4-FFF2-40B4-BE49-F238E27FC236}">
-                <a16:creationId xmlns:a16="http://schemas.microsoft.com/office/drawing/2014/main" id="{B34634D4-E6E5-4598-8416-1DA736BFC335}"/>
-              </a:ext>
-            </a:extLst>
-          </p:cNvPr>
-          <p:cNvSpPr txBox="1"/>
-          <p:nvPr/>
-        </p:nvSpPr>
-        <p:spPr>
-          <a:xfrm>
-            <a:off x="10251332" y="3663940"/>
-            <a:ext cx="2070573" cy="369332"/>
-          </a:xfrm>
-          <a:prstGeom prst="rect">
-            <a:avLst/>
-          </a:prstGeom>
-          <a:noFill/>
-        </p:spPr>
-        <p:txBody>
-          <a:bodyPr wrap="square" rtlCol="0">
-            <a:spAutoFit/>
-          </a:bodyPr>
-          <a:lstStyle/>
-          <a:p>
-            <a:r>
-              <a:rPr kumimoji="1" lang="en-US" altLang="ja-JP" err="1">
-                <a:solidFill>
-                  <a:srgbClr val="00B0F0"/>
-                </a:solidFill>
-              </a:rPr>
-              <a:t>Rc</a:t>
-            </a:r>
-            <a:r>
-              <a:rPr kumimoji="1" lang="en-US" altLang="ja-JP">
-                <a:solidFill>
-                  <a:srgbClr val="00B0F0"/>
-                </a:solidFill>
-              </a:rPr>
-              <a:t>&lt;</a:t>
-            </a:r>
-            <a:r>
-              <a:rPr kumimoji="1" lang="en-US" altLang="ja-JP" err="1">
-                <a:solidFill>
-                  <a:srgbClr val="00B0F0"/>
-                </a:solidFill>
-              </a:rPr>
-              <a:t>RefCell</a:t>
-            </a:r>
-            <a:r>
-              <a:rPr kumimoji="1" lang="en-US" altLang="ja-JP">
-                <a:solidFill>
-                  <a:srgbClr val="00B0F0"/>
-                </a:solidFill>
-              </a:rPr>
-              <a:t>&lt;</a:t>
-            </a:r>
-            <a:r>
-              <a:rPr kumimoji="1" lang="en-US" altLang="ja-JP">
-                <a:solidFill>
-                  <a:schemeClr val="accent4"/>
-                </a:solidFill>
-              </a:rPr>
-              <a:t>T</a:t>
-            </a:r>
-            <a:r>
-              <a:rPr kumimoji="1" lang="en-US" altLang="ja-JP">
-                <a:solidFill>
-                  <a:srgbClr val="00B0F0"/>
-                </a:solidFill>
-              </a:rPr>
-              <a:t>&gt;&gt;</a:t>
-            </a:r>
-            <a:endParaRPr kumimoji="1" lang="ja-JP" altLang="en-US">
-              <a:solidFill>
-                <a:srgbClr val="00B0F0"/>
-              </a:solidFill>
-            </a:endParaRPr>
-          </a:p>
-        </p:txBody>
-      </p:sp>
-      <p:sp>
-        <p:nvSpPr>
-          <p:cNvPr id="25" name="テキスト ボックス 24">
-            <a:extLst>
-              <a:ext uri="{FF2B5EF4-FFF2-40B4-BE49-F238E27FC236}">
-                <a16:creationId xmlns:a16="http://schemas.microsoft.com/office/drawing/2014/main" id="{080D8927-B900-4E19-A9CB-C092D81DFB69}"/>
-              </a:ext>
-            </a:extLst>
-          </p:cNvPr>
-          <p:cNvSpPr txBox="1"/>
-          <p:nvPr/>
-        </p:nvSpPr>
-        <p:spPr>
-          <a:xfrm>
-            <a:off x="10251332" y="5227060"/>
-            <a:ext cx="2070573" cy="369332"/>
-          </a:xfrm>
-          <a:prstGeom prst="rect">
-            <a:avLst/>
-          </a:prstGeom>
-          <a:noFill/>
-        </p:spPr>
-        <p:txBody>
-          <a:bodyPr wrap="square" rtlCol="0">
-            <a:spAutoFit/>
-          </a:bodyPr>
-          <a:lstStyle/>
-          <a:p>
-            <a:r>
-              <a:rPr kumimoji="1" lang="en-US" altLang="ja-JP">
-                <a:solidFill>
-                  <a:schemeClr val="accent6"/>
-                </a:solidFill>
-              </a:rPr>
-              <a:t>Arc&lt;</a:t>
-            </a:r>
-            <a:r>
-              <a:rPr kumimoji="1" lang="en-US" altLang="ja-JP">
-                <a:solidFill>
-                  <a:schemeClr val="bg1">
-                    <a:lumMod val="75000"/>
-                  </a:schemeClr>
-                </a:solidFill>
-              </a:rPr>
-              <a:t>T</a:t>
-            </a:r>
-            <a:r>
-              <a:rPr kumimoji="1" lang="en-US" altLang="ja-JP">
-                <a:solidFill>
-                  <a:schemeClr val="accent6"/>
-                </a:solidFill>
-              </a:rPr>
-              <a:t>&gt;</a:t>
-            </a:r>
-            <a:endParaRPr kumimoji="1" lang="ja-JP" altLang="en-US">
-              <a:solidFill>
-                <a:schemeClr val="accent6"/>
-              </a:solidFill>
-            </a:endParaRPr>
-          </a:p>
-        </p:txBody>
-      </p:sp>
-      <p:sp>
-        <p:nvSpPr>
-          <p:cNvPr id="27" name="テキスト ボックス 26">
-            <a:extLst>
-              <a:ext uri="{FF2B5EF4-FFF2-40B4-BE49-F238E27FC236}">
-                <a16:creationId xmlns:a16="http://schemas.microsoft.com/office/drawing/2014/main" id="{E3FEF7C4-BBFC-4978-8BD4-60B7C5AE4C0B}"/>
-              </a:ext>
-            </a:extLst>
-          </p:cNvPr>
-          <p:cNvSpPr txBox="1"/>
-          <p:nvPr/>
-        </p:nvSpPr>
-        <p:spPr>
-          <a:xfrm>
-            <a:off x="10251332" y="6008620"/>
-            <a:ext cx="2070573" cy="369332"/>
-          </a:xfrm>
-          <a:prstGeom prst="rect">
-            <a:avLst/>
-          </a:prstGeom>
-          <a:noFill/>
-        </p:spPr>
-        <p:txBody>
-          <a:bodyPr wrap="square" rtlCol="0">
-            <a:spAutoFit/>
-          </a:bodyPr>
-          <a:lstStyle/>
-          <a:p>
-            <a:r>
-              <a:rPr kumimoji="1" lang="en-US" altLang="ja-JP">
-                <a:solidFill>
-                  <a:schemeClr val="accent6"/>
-                </a:solidFill>
-              </a:rPr>
-              <a:t>Arc&lt;Mutex&lt;</a:t>
-            </a:r>
-            <a:r>
-              <a:rPr kumimoji="1" lang="en-US" altLang="ja-JP">
-                <a:solidFill>
-                  <a:schemeClr val="accent4"/>
-                </a:solidFill>
-              </a:rPr>
-              <a:t>T</a:t>
-            </a:r>
-            <a:r>
-              <a:rPr kumimoji="1" lang="en-US" altLang="ja-JP">
-                <a:solidFill>
-                  <a:schemeClr val="accent6"/>
-                </a:solidFill>
-              </a:rPr>
-              <a:t>&gt;&gt;</a:t>
-            </a:r>
-            <a:endParaRPr kumimoji="1" lang="ja-JP" altLang="en-US">
-              <a:solidFill>
-                <a:schemeClr val="accent6"/>
-              </a:solidFill>
-            </a:endParaRPr>
-          </a:p>
-        </p:txBody>
-      </p:sp>
-      <p:sp>
-        <p:nvSpPr>
-          <p:cNvPr id="29" name="テキスト ボックス 28">
-            <a:extLst>
-              <a:ext uri="{FF2B5EF4-FFF2-40B4-BE49-F238E27FC236}">
-                <a16:creationId xmlns:a16="http://schemas.microsoft.com/office/drawing/2014/main" id="{CFFF48BE-642E-43A6-B8F4-449503B354CC}"/>
-              </a:ext>
-            </a:extLst>
-          </p:cNvPr>
-          <p:cNvSpPr txBox="1"/>
-          <p:nvPr/>
-        </p:nvSpPr>
-        <p:spPr>
-          <a:xfrm>
-            <a:off x="10251332" y="6399400"/>
-            <a:ext cx="2070573" cy="369332"/>
-          </a:xfrm>
-          <a:prstGeom prst="rect">
-            <a:avLst/>
-          </a:prstGeom>
-          <a:noFill/>
-        </p:spPr>
-        <p:txBody>
-          <a:bodyPr wrap="square" rtlCol="0">
-            <a:spAutoFit/>
-          </a:bodyPr>
-          <a:lstStyle/>
-          <a:p>
-            <a:r>
-              <a:rPr kumimoji="1" lang="en-US" altLang="ja-JP">
-                <a:solidFill>
-                  <a:schemeClr val="accent6"/>
-                </a:solidFill>
-              </a:rPr>
-              <a:t>Arc&lt;</a:t>
-            </a:r>
-            <a:r>
-              <a:rPr kumimoji="1" lang="en-US" altLang="ja-JP" err="1">
-                <a:solidFill>
-                  <a:schemeClr val="accent6"/>
-                </a:solidFill>
-              </a:rPr>
-              <a:t>RwLock</a:t>
-            </a:r>
-            <a:r>
-              <a:rPr kumimoji="1" lang="en-US" altLang="ja-JP">
-                <a:solidFill>
-                  <a:schemeClr val="accent6"/>
-                </a:solidFill>
-              </a:rPr>
-              <a:t>&lt;</a:t>
-            </a:r>
-            <a:r>
-              <a:rPr kumimoji="1" lang="en-US" altLang="ja-JP">
-                <a:solidFill>
-                  <a:schemeClr val="accent4"/>
-                </a:solidFill>
-              </a:rPr>
-              <a:t>T</a:t>
-            </a:r>
-            <a:r>
-              <a:rPr kumimoji="1" lang="en-US" altLang="ja-JP">
-                <a:solidFill>
-                  <a:schemeClr val="accent6"/>
-                </a:solidFill>
-              </a:rPr>
-              <a:t>&gt;&gt;</a:t>
-            </a:r>
-            <a:endParaRPr kumimoji="1" lang="ja-JP" altLang="en-US">
-              <a:solidFill>
-                <a:schemeClr val="accent6"/>
-              </a:solidFill>
-            </a:endParaRPr>
-          </a:p>
-        </p:txBody>
-      </p:sp>
-      <p:sp>
-        <p:nvSpPr>
-          <p:cNvPr id="31" name="テキスト ボックス 30">
-            <a:extLst>
-              <a:ext uri="{FF2B5EF4-FFF2-40B4-BE49-F238E27FC236}">
-                <a16:creationId xmlns:a16="http://schemas.microsoft.com/office/drawing/2014/main" id="{DFBCD7E6-BC37-400D-9A06-5DD5234F7D3D}"/>
-              </a:ext>
-            </a:extLst>
-          </p:cNvPr>
-          <p:cNvSpPr txBox="1"/>
-          <p:nvPr/>
-        </p:nvSpPr>
-        <p:spPr>
-          <a:xfrm>
-            <a:off x="8054323" y="6010724"/>
+            <a:off x="7894048" y="6010724"/>
             <a:ext cx="640080" cy="369332"/>
           </a:xfrm>
           <a:prstGeom prst="rect">
@@ -4277,7 +4373,7 @@
         </p:nvSpPr>
         <p:spPr>
           <a:xfrm>
-            <a:off x="4021720" y="5224516"/>
+            <a:off x="3963432" y="5224516"/>
             <a:ext cx="978538" cy="369332"/>
           </a:xfrm>
           <a:prstGeom prst="rect">
@@ -4477,7 +4573,7 @@
         <p:spPr>
           <a:xfrm>
             <a:off x="3017523" y="4621785"/>
-            <a:ext cx="2471609" cy="2872"/>
+            <a:ext cx="2311334" cy="2872"/>
           </a:xfrm>
           <a:prstGeom prst="bentConnector3">
             <a:avLst>
@@ -4526,8 +4622,8 @@
         </p:nvCxnSpPr>
         <p:spPr>
           <a:xfrm rot="16200000" flipH="1">
-            <a:off x="2917805" y="4305266"/>
-            <a:ext cx="602731" cy="1605099"/>
+            <a:off x="2888661" y="4334410"/>
+            <a:ext cx="602731" cy="1546811"/>
           </a:xfrm>
           <a:prstGeom prst="bentConnector2">
             <a:avLst/>
@@ -4616,7 +4712,7 @@
         </p:nvSpPr>
         <p:spPr>
           <a:xfrm>
-            <a:off x="4419169" y="6112418"/>
+            <a:off x="4360881" y="6112418"/>
             <a:ext cx="798617" cy="369332"/>
           </a:xfrm>
           <a:prstGeom prst="rect">
@@ -4806,57 +4902,6 @@
       </p:cxnSp>
       <p:cxnSp>
         <p:nvCxnSpPr>
-          <p:cNvPr id="67" name="コネクタ: カギ線 66">
-            <a:extLst>
-              <a:ext uri="{FF2B5EF4-FFF2-40B4-BE49-F238E27FC236}">
-                <a16:creationId xmlns:a16="http://schemas.microsoft.com/office/drawing/2014/main" id="{61F1768A-F3D5-4FEE-8EDF-FD03934B7A31}"/>
-              </a:ext>
-            </a:extLst>
-          </p:cNvPr>
-          <p:cNvCxnSpPr>
-            <a:cxnSpLocks/>
-            <a:stCxn id="1017" idx="0"/>
-            <a:endCxn id="181" idx="1"/>
-          </p:cNvCxnSpPr>
-          <p:nvPr/>
-        </p:nvCxnSpPr>
-        <p:spPr>
-          <a:xfrm rot="16200000" flipV="1">
-            <a:off x="10345322" y="561996"/>
-            <a:ext cx="732987" cy="920965"/>
-          </a:xfrm>
-          <a:prstGeom prst="bentConnector4">
-            <a:avLst>
-              <a:gd name="adj1" fmla="val 37403"/>
-              <a:gd name="adj2" fmla="val 250310"/>
-            </a:avLst>
-          </a:prstGeom>
-          <a:ln w="9525">
-            <a:solidFill>
-              <a:srgbClr val="6600CC"/>
-            </a:solidFill>
-            <a:prstDash val="lgDash"/>
-            <a:headEnd type="triangle" w="med" len="med"/>
-            <a:tailEnd type="triangle" w="med" len="med"/>
-          </a:ln>
-        </p:spPr>
-        <p:style>
-          <a:lnRef idx="1">
-            <a:schemeClr val="accent1"/>
-          </a:lnRef>
-          <a:fillRef idx="0">
-            <a:schemeClr val="accent1"/>
-          </a:fillRef>
-          <a:effectRef idx="0">
-            <a:schemeClr val="accent1"/>
-          </a:effectRef>
-          <a:fontRef idx="minor">
-            <a:schemeClr val="tx1"/>
-          </a:fontRef>
-        </p:style>
-      </p:cxnSp>
-      <p:cxnSp>
-        <p:nvCxnSpPr>
           <p:cNvPr id="69" name="コネクタ: カギ線 68">
             <a:extLst>
               <a:ext uri="{FF2B5EF4-FFF2-40B4-BE49-F238E27FC236}">
@@ -4873,8 +4918,8 @@
         </p:nvCxnSpPr>
         <p:spPr>
           <a:xfrm rot="16200000" flipH="1">
-            <a:off x="4699599" y="5405237"/>
-            <a:ext cx="600923" cy="978143"/>
+            <a:off x="4590318" y="5456231"/>
+            <a:ext cx="600923" cy="876156"/>
           </a:xfrm>
           <a:prstGeom prst="bentConnector2">
             <a:avLst/>
@@ -4919,8 +4964,8 @@
         </p:nvCxnSpPr>
         <p:spPr>
           <a:xfrm>
-            <a:off x="5000258" y="5409182"/>
-            <a:ext cx="5251074" cy="2544"/>
+            <a:off x="4941970" y="5409182"/>
+            <a:ext cx="5024448" cy="2544"/>
           </a:xfrm>
           <a:prstGeom prst="bentConnector3">
             <a:avLst/>
@@ -4963,7 +5008,7 @@
         </p:nvSpPr>
         <p:spPr>
           <a:xfrm>
-            <a:off x="8032216" y="3661128"/>
+            <a:off x="7871941" y="3661128"/>
             <a:ext cx="627864" cy="369332"/>
           </a:xfrm>
           <a:prstGeom prst="rect">
@@ -5020,8 +5065,8 @@
         </p:nvCxnSpPr>
         <p:spPr>
           <a:xfrm rot="5400000" flipH="1" flipV="1">
-            <a:off x="9194827" y="1436808"/>
-            <a:ext cx="207827" cy="1905184"/>
+            <a:off x="8970907" y="1109560"/>
+            <a:ext cx="210476" cy="1780545"/>
           </a:xfrm>
           <a:prstGeom prst="bentConnector2">
             <a:avLst/>
@@ -5066,8 +5111,8 @@
         </p:nvCxnSpPr>
         <p:spPr>
           <a:xfrm>
-            <a:off x="5027560" y="3065915"/>
-            <a:ext cx="5223772" cy="1131"/>
+            <a:off x="4969272" y="3065915"/>
+            <a:ext cx="4997146" cy="1131"/>
           </a:xfrm>
           <a:prstGeom prst="bentConnector3">
             <a:avLst>
@@ -5112,7 +5157,7 @@
         </p:nvSpPr>
         <p:spPr>
           <a:xfrm>
-            <a:off x="4987988" y="5096144"/>
+            <a:off x="4929700" y="5096144"/>
             <a:ext cx="1433790" cy="369332"/>
           </a:xfrm>
           <a:prstGeom prst="rect">
@@ -5160,7 +5205,7 @@
         </p:nvSpPr>
         <p:spPr>
           <a:xfrm>
-            <a:off x="5489132" y="6010105"/>
+            <a:off x="5328857" y="6010105"/>
             <a:ext cx="604653" cy="369332"/>
           </a:xfrm>
           <a:prstGeom prst="rect">
@@ -5213,7 +5258,7 @@
         </p:nvSpPr>
         <p:spPr>
           <a:xfrm>
-            <a:off x="4019085" y="1358830"/>
+            <a:off x="3960797" y="1358830"/>
             <a:ext cx="939553" cy="369332"/>
           </a:xfrm>
           <a:prstGeom prst="rect">
@@ -5301,36 +5346,14 @@
             <a:r>
               <a:rPr lang="en-US" altLang="ja-JP">
                 <a:solidFill>
-                  <a:schemeClr val="accent6">
-                    <a:lumMod val="75000"/>
-                  </a:schemeClr>
-                </a:solidFill>
-              </a:rPr>
-              <a:t>&lt;</a:t>
-            </a:r>
-            <a:r>
-              <a:rPr lang="en-US" altLang="ja-JP">
-                <a:solidFill>
                   <a:schemeClr val="accent6"/>
                 </a:solidFill>
               </a:rPr>
-              <a:t>multiple</a:t>
-            </a:r>
-            <a:r>
-              <a:rPr lang="en-US" altLang="ja-JP">
-                <a:solidFill>
-                  <a:schemeClr val="accent6">
-                    <a:lumMod val="75000"/>
-                  </a:schemeClr>
-                </a:solidFill>
-              </a:rPr>
-              <a:t>&gt;</a:t>
+              <a:t>&lt;multiple&gt;</a:t>
             </a:r>
             <a:endParaRPr kumimoji="1" lang="ja-JP" altLang="en-US">
               <a:solidFill>
-                <a:schemeClr val="accent6">
-                  <a:lumMod val="75000"/>
-                </a:schemeClr>
+                <a:schemeClr val="accent6"/>
               </a:solidFill>
             </a:endParaRPr>
           </a:p>
@@ -5348,14 +5371,14 @@
           <p:cNvCxnSpPr>
             <a:cxnSpLocks/>
             <a:stCxn id="119" idx="3"/>
-            <a:endCxn id="5" idx="1"/>
+            <a:endCxn id="730" idx="1"/>
           </p:cNvCxnSpPr>
           <p:nvPr/>
         </p:nvCxnSpPr>
         <p:spPr>
-          <a:xfrm>
-            <a:off x="4958638" y="1543496"/>
-            <a:ext cx="5292694" cy="1870"/>
+          <a:xfrm flipV="1">
+            <a:off x="4900350" y="1543192"/>
+            <a:ext cx="792996" cy="304"/>
           </a:xfrm>
           <a:prstGeom prst="bentConnector3">
             <a:avLst>
@@ -5400,8 +5423,8 @@
         </p:nvSpPr>
         <p:spPr>
           <a:xfrm>
-            <a:off x="10251332" y="107497"/>
-            <a:ext cx="1716196" cy="369332"/>
+            <a:off x="9966417" y="107497"/>
+            <a:ext cx="2090179" cy="369332"/>
           </a:xfrm>
           <a:prstGeom prst="rect">
             <a:avLst/>
@@ -5417,42 +5440,226 @@
             <a:r>
               <a:rPr kumimoji="1" lang="en-US" altLang="ja-JP">
                 <a:solidFill>
+                  <a:srgbClr val="996633"/>
+                </a:solidFill>
+              </a:rPr>
+              <a:t>&amp;</a:t>
+            </a:r>
+            <a:r>
+              <a:rPr kumimoji="1" lang="en-US" altLang="ja-JP">
+                <a:solidFill>
                   <a:schemeClr val="bg1">
                     <a:lumMod val="75000"/>
                   </a:schemeClr>
                 </a:solidFill>
               </a:rPr>
-              <a:t>&amp;T </a:t>
+              <a:t>T </a:t>
             </a:r>
             <a:r>
               <a:rPr kumimoji="1" lang="ja-JP" altLang="en-US">
+                <a:solidFill>
+                  <a:srgbClr val="818181"/>
+                </a:solidFill>
+              </a:rPr>
+              <a:t>≈ </a:t>
+            </a:r>
+            <a:r>
+              <a:rPr kumimoji="1" lang="en-US" altLang="ja-JP">
+                <a:solidFill>
+                  <a:srgbClr val="818181"/>
+                </a:solidFill>
+              </a:rPr>
+              <a:t>*const T</a:t>
+            </a:r>
+          </a:p>
+        </p:txBody>
+      </p:sp>
+      <p:sp>
+        <p:nvSpPr>
+          <p:cNvPr id="169" name="テキスト ボックス 168">
+            <a:extLst>
+              <a:ext uri="{FF2B5EF4-FFF2-40B4-BE49-F238E27FC236}">
+                <a16:creationId xmlns:a16="http://schemas.microsoft.com/office/drawing/2014/main" id="{5708A2F5-938A-43D7-BA16-96C1B47AFAD8}"/>
+              </a:ext>
+            </a:extLst>
+          </p:cNvPr>
+          <p:cNvSpPr txBox="1"/>
+          <p:nvPr/>
+        </p:nvSpPr>
+        <p:spPr>
+          <a:xfrm>
+            <a:off x="9966417" y="2496312"/>
+            <a:ext cx="2090179" cy="369332"/>
+          </a:xfrm>
+          <a:prstGeom prst="rect">
+            <a:avLst/>
+          </a:prstGeom>
+          <a:noFill/>
+        </p:spPr>
+        <p:txBody>
+          <a:bodyPr wrap="square" rtlCol="0">
+            <a:spAutoFit/>
+          </a:bodyPr>
+          <a:lstStyle/>
+          <a:p>
+            <a:r>
+              <a:rPr kumimoji="1" lang="en-US" altLang="ja-JP">
+                <a:solidFill>
+                  <a:srgbClr val="00B0F0"/>
+                </a:solidFill>
+              </a:rPr>
+              <a:t>Box&lt;</a:t>
+            </a:r>
+            <a:r>
+              <a:rPr kumimoji="1" lang="en-US" altLang="ja-JP">
+                <a:solidFill>
+                  <a:schemeClr val="bg1">
+                    <a:lumMod val="75000"/>
+                  </a:schemeClr>
+                </a:solidFill>
+              </a:rPr>
+              <a:t>T</a:t>
+            </a:r>
+            <a:r>
+              <a:rPr kumimoji="1" lang="en-US" altLang="ja-JP">
+                <a:solidFill>
+                  <a:srgbClr val="00B0F0"/>
+                </a:solidFill>
+              </a:rPr>
+              <a:t>&gt; </a:t>
+            </a:r>
+            <a:r>
+              <a:rPr kumimoji="1" lang="en-US" altLang="ja-JP">
+                <a:solidFill>
+                  <a:srgbClr val="818181"/>
+                </a:solidFill>
+              </a:rPr>
+              <a:t>or</a:t>
+            </a:r>
+            <a:r>
+              <a:rPr kumimoji="1" lang="en-US" altLang="ja-JP">
+                <a:solidFill>
+                  <a:srgbClr val="00B0F0"/>
+                </a:solidFill>
+              </a:rPr>
+              <a:t> </a:t>
+            </a:r>
+            <a:r>
+              <a:rPr kumimoji="1" lang="en-US" altLang="ja-JP">
+                <a:solidFill>
+                  <a:schemeClr val="accent4"/>
+                </a:solidFill>
+              </a:rPr>
+              <a:t>mut</a:t>
+            </a:r>
+            <a:r>
+              <a:rPr kumimoji="1" lang="en-US" altLang="ja-JP" baseline="30000">
+                <a:solidFill>
+                  <a:srgbClr val="818181"/>
+                </a:solidFill>
+              </a:rPr>
+              <a:t>(†1)</a:t>
+            </a:r>
+            <a:endParaRPr kumimoji="1" lang="ja-JP" altLang="en-US">
+              <a:solidFill>
+                <a:srgbClr val="818181"/>
+              </a:solidFill>
+            </a:endParaRPr>
+          </a:p>
+        </p:txBody>
+      </p:sp>
+      <p:sp>
+        <p:nvSpPr>
+          <p:cNvPr id="181" name="テキスト ボックス 180">
+            <a:extLst>
+              <a:ext uri="{FF2B5EF4-FFF2-40B4-BE49-F238E27FC236}">
+                <a16:creationId xmlns:a16="http://schemas.microsoft.com/office/drawing/2014/main" id="{A123369A-1817-491D-89F3-44C96E8C9E71}"/>
+              </a:ext>
+            </a:extLst>
+          </p:cNvPr>
+          <p:cNvSpPr txBox="1"/>
+          <p:nvPr/>
+        </p:nvSpPr>
+        <p:spPr>
+          <a:xfrm>
+            <a:off x="9966417" y="471319"/>
+            <a:ext cx="2090179" cy="369332"/>
+          </a:xfrm>
+          <a:prstGeom prst="rect">
+            <a:avLst/>
+          </a:prstGeom>
+          <a:noFill/>
+        </p:spPr>
+        <p:txBody>
+          <a:bodyPr wrap="square" rtlCol="0">
+            <a:spAutoFit/>
+          </a:bodyPr>
+          <a:lstStyle/>
+          <a:p>
+            <a:r>
+              <a:rPr kumimoji="1" lang="en-US" altLang="ja-JP">
+                <a:solidFill>
+                  <a:srgbClr val="996633"/>
+                </a:solidFill>
+              </a:rPr>
+              <a:t>&amp;</a:t>
+            </a:r>
+            <a:r>
+              <a:rPr kumimoji="1" lang="en-US" altLang="ja-JP">
+                <a:solidFill>
+                  <a:schemeClr val="accent4"/>
+                </a:solidFill>
+              </a:rPr>
+              <a:t>mut T</a:t>
+            </a:r>
+            <a:r>
+              <a:rPr kumimoji="1" lang="en-US" altLang="ja-JP">
                 <a:solidFill>
                   <a:schemeClr val="bg2">
                     <a:lumMod val="50000"/>
                   </a:schemeClr>
                 </a:solidFill>
               </a:rPr>
+              <a:t> </a:t>
+            </a:r>
+            <a:r>
+              <a:rPr kumimoji="1" lang="ja-JP" altLang="en-US">
+                <a:solidFill>
+                  <a:srgbClr val="818181"/>
+                </a:solidFill>
+              </a:rPr>
               <a:t>≈ </a:t>
             </a:r>
             <a:r>
               <a:rPr kumimoji="1" lang="en-US" altLang="ja-JP">
                 <a:solidFill>
-                  <a:schemeClr val="bg2">
-                    <a:lumMod val="50000"/>
-                  </a:schemeClr>
-                </a:solidFill>
-              </a:rPr>
-              <a:t>*const T</a:t>
-            </a:r>
-          </a:p>
-        </p:txBody>
-      </p:sp>
-      <p:sp>
-        <p:nvSpPr>
-          <p:cNvPr id="169" name="テキスト ボックス 168">
-            <a:extLst>
-              <a:ext uri="{FF2B5EF4-FFF2-40B4-BE49-F238E27FC236}">
-                <a16:creationId xmlns:a16="http://schemas.microsoft.com/office/drawing/2014/main" id="{5708A2F5-938A-43D7-BA16-96C1B47AFAD8}"/>
+                  <a:srgbClr val="818181"/>
+                </a:solidFill>
+              </a:rPr>
+              <a:t>*mut T </a:t>
+            </a:r>
+            <a:r>
+              <a:rPr kumimoji="1" lang="en-US" altLang="ja-JP" baseline="30000">
+                <a:solidFill>
+                  <a:srgbClr val="818181"/>
+                </a:solidFill>
+              </a:rPr>
+              <a:t>(†1)</a:t>
+            </a:r>
+            <a:endParaRPr kumimoji="1" lang="ja-JP" altLang="en-US">
+              <a:solidFill>
+                <a:srgbClr val="818181"/>
+              </a:solidFill>
+            </a:endParaRPr>
+          </a:p>
+        </p:txBody>
+      </p:sp>
+      <p:sp>
+        <p:nvSpPr>
+          <p:cNvPr id="183" name="テキスト ボックス 182">
+            <a:extLst>
+              <a:ext uri="{FF2B5EF4-FFF2-40B4-BE49-F238E27FC236}">
+                <a16:creationId xmlns:a16="http://schemas.microsoft.com/office/drawing/2014/main" id="{5D586BE9-E8C4-47D4-8AA0-A719D185CAA7}"/>
               </a:ext>
             </a:extLst>
           </p:cNvPr>
@@ -5461,185 +5668,28 @@
         </p:nvSpPr>
         <p:spPr>
           <a:xfrm>
-            <a:off x="10251332" y="1710040"/>
-            <a:ext cx="2570588" cy="369332"/>
+            <a:off x="4891609" y="1218230"/>
+            <a:ext cx="889411" cy="369332"/>
           </a:xfrm>
           <a:prstGeom prst="rect">
             <a:avLst/>
           </a:prstGeom>
-          <a:noFill/>
-        </p:spPr>
-        <p:txBody>
-          <a:bodyPr wrap="square" rtlCol="0">
+        </p:spPr>
+        <p:txBody>
+          <a:bodyPr wrap="none" rtlCol="0">
             <a:spAutoFit/>
           </a:bodyPr>
           <a:lstStyle/>
           <a:p>
             <a:r>
-              <a:rPr kumimoji="1" lang="en-US" altLang="ja-JP">
-                <a:solidFill>
-                  <a:srgbClr val="00B0F0"/>
-                </a:solidFill>
-              </a:rPr>
-              <a:t>Box&lt;</a:t>
-            </a:r>
-            <a:r>
-              <a:rPr kumimoji="1" lang="en-US" altLang="ja-JP">
+              <a:rPr lang="en-US" altLang="ja-JP">
                 <a:solidFill>
                   <a:schemeClr val="bg1">
                     <a:lumMod val="75000"/>
                   </a:schemeClr>
                 </a:solidFill>
               </a:rPr>
-              <a:t>T</a:t>
-            </a:r>
-            <a:r>
-              <a:rPr kumimoji="1" lang="en-US" altLang="ja-JP">
-                <a:solidFill>
-                  <a:srgbClr val="00B0F0"/>
-                </a:solidFill>
-              </a:rPr>
-              <a:t>&gt; </a:t>
-            </a:r>
-            <a:r>
-              <a:rPr kumimoji="1" lang="en-US" altLang="ja-JP">
-                <a:solidFill>
-                  <a:schemeClr val="bg2">
-                    <a:lumMod val="50000"/>
-                  </a:schemeClr>
-                </a:solidFill>
-              </a:rPr>
-              <a:t>or</a:t>
-            </a:r>
-            <a:r>
-              <a:rPr kumimoji="1" lang="en-US" altLang="ja-JP">
-                <a:solidFill>
-                  <a:srgbClr val="00B0F0"/>
-                </a:solidFill>
-              </a:rPr>
-              <a:t> </a:t>
-            </a:r>
-            <a:r>
-              <a:rPr kumimoji="1" lang="en-US" altLang="ja-JP">
-                <a:solidFill>
-                  <a:schemeClr val="accent4"/>
-                </a:solidFill>
-              </a:rPr>
-              <a:t>mut</a:t>
-            </a:r>
-            <a:r>
-              <a:rPr kumimoji="1" lang="en-US" altLang="ja-JP" baseline="30000">
-                <a:solidFill>
-                  <a:schemeClr val="bg2">
-                    <a:lumMod val="50000"/>
-                  </a:schemeClr>
-                </a:solidFill>
-              </a:rPr>
-              <a:t>(†1)</a:t>
-            </a:r>
-            <a:endParaRPr kumimoji="1" lang="ja-JP" altLang="en-US">
-              <a:solidFill>
-                <a:schemeClr val="accent4"/>
-              </a:solidFill>
-            </a:endParaRPr>
-          </a:p>
-        </p:txBody>
-      </p:sp>
-      <p:sp>
-        <p:nvSpPr>
-          <p:cNvPr id="181" name="テキスト ボックス 180">
-            <a:extLst>
-              <a:ext uri="{FF2B5EF4-FFF2-40B4-BE49-F238E27FC236}">
-                <a16:creationId xmlns:a16="http://schemas.microsoft.com/office/drawing/2014/main" id="{A123369A-1817-491D-89F3-44C96E8C9E71}"/>
-              </a:ext>
-            </a:extLst>
-          </p:cNvPr>
-          <p:cNvSpPr txBox="1"/>
-          <p:nvPr/>
-        </p:nvSpPr>
-        <p:spPr>
-          <a:xfrm>
-            <a:off x="10251332" y="471319"/>
-            <a:ext cx="2070573" cy="369332"/>
-          </a:xfrm>
-          <a:prstGeom prst="rect">
-            <a:avLst/>
-          </a:prstGeom>
-          <a:noFill/>
-        </p:spPr>
-        <p:txBody>
-          <a:bodyPr wrap="square" rtlCol="0">
-            <a:spAutoFit/>
-          </a:bodyPr>
-          <a:lstStyle/>
-          <a:p>
-            <a:r>
-              <a:rPr kumimoji="1" lang="en-US" altLang="ja-JP">
-                <a:solidFill>
-                  <a:schemeClr val="bg1">
-                    <a:lumMod val="75000"/>
-                  </a:schemeClr>
-                </a:solidFill>
-              </a:rPr>
-              <a:t>&amp;</a:t>
-            </a:r>
-            <a:r>
-              <a:rPr kumimoji="1" lang="en-US" altLang="ja-JP">
-                <a:solidFill>
-                  <a:schemeClr val="accent4"/>
-                </a:solidFill>
-              </a:rPr>
-              <a:t>mut T</a:t>
-            </a:r>
-            <a:r>
-              <a:rPr kumimoji="1" lang="en-US" altLang="ja-JP">
-                <a:solidFill>
-                  <a:schemeClr val="bg2">
-                    <a:lumMod val="50000"/>
-                  </a:schemeClr>
-                </a:solidFill>
-              </a:rPr>
-              <a:t> </a:t>
-            </a:r>
-            <a:r>
-              <a:rPr kumimoji="1" lang="ja-JP" altLang="en-US">
-                <a:solidFill>
-                  <a:schemeClr val="bg2">
-                    <a:lumMod val="50000"/>
-                  </a:schemeClr>
-                </a:solidFill>
-              </a:rPr>
-              <a:t>≈ </a:t>
-            </a:r>
-            <a:r>
-              <a:rPr kumimoji="1" lang="en-US" altLang="ja-JP">
-                <a:solidFill>
-                  <a:schemeClr val="bg2">
-                    <a:lumMod val="50000"/>
-                  </a:schemeClr>
-                </a:solidFill>
-              </a:rPr>
-              <a:t>*mut T</a:t>
-            </a:r>
-            <a:r>
-              <a:rPr kumimoji="1" lang="en-US" altLang="ja-JP">
-                <a:solidFill>
-                  <a:schemeClr val="bg1">
-                    <a:lumMod val="75000"/>
-                  </a:schemeClr>
-                </a:solidFill>
-              </a:rPr>
-              <a:t> </a:t>
-            </a:r>
-            <a:r>
-              <a:rPr kumimoji="1" lang="en-US" altLang="ja-JP" baseline="30000">
-                <a:solidFill>
-                  <a:schemeClr val="bg2">
-                    <a:lumMod val="50000"/>
-                  </a:schemeClr>
-                </a:solidFill>
-              </a:rPr>
-              <a:t>(†1)</a:t>
+              <a:t>&lt;stack&gt;</a:t>
             </a:r>
             <a:endParaRPr kumimoji="1" lang="ja-JP" altLang="en-US">
               <a:solidFill>
@@ -5653,10 +5703,10 @@
       </p:sp>
       <p:sp>
         <p:nvSpPr>
-          <p:cNvPr id="183" name="テキスト ボックス 182">
-            <a:extLst>
-              <a:ext uri="{FF2B5EF4-FFF2-40B4-BE49-F238E27FC236}">
-                <a16:creationId xmlns:a16="http://schemas.microsoft.com/office/drawing/2014/main" id="{5D586BE9-E8C4-47D4-8AA0-A719D185CAA7}"/>
+          <p:cNvPr id="185" name="テキスト ボックス 184">
+            <a:extLst>
+              <a:ext uri="{FF2B5EF4-FFF2-40B4-BE49-F238E27FC236}">
+                <a16:creationId xmlns:a16="http://schemas.microsoft.com/office/drawing/2014/main" id="{07252E8E-9C58-4A3F-A4FF-6E75CD24313B}"/>
               </a:ext>
             </a:extLst>
           </p:cNvPr>
@@ -5665,12 +5715,13 @@
         </p:nvSpPr>
         <p:spPr>
           <a:xfrm>
-            <a:off x="4949897" y="1218230"/>
-            <a:ext cx="889411" cy="369332"/>
+            <a:off x="4380814" y="2317931"/>
+            <a:ext cx="885179" cy="369332"/>
           </a:xfrm>
           <a:prstGeom prst="rect">
             <a:avLst/>
           </a:prstGeom>
+          <a:noFill/>
         </p:spPr>
         <p:txBody>
           <a:bodyPr wrap="none" rtlCol="0">
@@ -5681,12 +5732,61 @@
             <a:r>
               <a:rPr lang="en-US" altLang="ja-JP">
                 <a:solidFill>
+                  <a:schemeClr val="accent2"/>
+                </a:solidFill>
+              </a:rPr>
+              <a:t>&lt;heap&gt;</a:t>
+            </a:r>
+            <a:endParaRPr kumimoji="1" lang="ja-JP" altLang="en-US">
+              <a:solidFill>
+                <a:schemeClr val="accent2"/>
+              </a:solidFill>
+            </a:endParaRPr>
+          </a:p>
+        </p:txBody>
+      </p:sp>
+      <p:sp>
+        <p:nvSpPr>
+          <p:cNvPr id="291" name="テキスト ボックス 290">
+            <a:extLst>
+              <a:ext uri="{FF2B5EF4-FFF2-40B4-BE49-F238E27FC236}">
+                <a16:creationId xmlns:a16="http://schemas.microsoft.com/office/drawing/2014/main" id="{22BC25F5-15D0-44A9-BC67-9B2BB2747FE4}"/>
+              </a:ext>
+            </a:extLst>
+          </p:cNvPr>
+          <p:cNvSpPr txBox="1"/>
+          <p:nvPr/>
+        </p:nvSpPr>
+        <p:spPr>
+          <a:xfrm>
+            <a:off x="3963432" y="2881249"/>
+            <a:ext cx="1005840" cy="369332"/>
+          </a:xfrm>
+          <a:prstGeom prst="rect">
+            <a:avLst/>
+          </a:prstGeom>
+          <a:noFill/>
+          <a:ln>
+            <a:solidFill>
+              <a:schemeClr val="accent4"/>
+            </a:solidFill>
+          </a:ln>
+        </p:spPr>
+        <p:txBody>
+          <a:bodyPr wrap="none" rtlCol="0">
+            <a:spAutoFit/>
+          </a:bodyPr>
+          <a:lstStyle/>
+          <a:p>
+            <a:r>
+              <a:rPr kumimoji="1" lang="en-US" altLang="ja-JP">
+                <a:solidFill>
                   <a:schemeClr val="bg1">
                     <a:lumMod val="75000"/>
                   </a:schemeClr>
                 </a:solidFill>
               </a:rPr>
-              <a:t>&lt;stack&gt;</a:t>
+              <a:t>Mutable</a:t>
             </a:r>
             <a:endParaRPr kumimoji="1" lang="ja-JP" altLang="en-US">
               <a:solidFill>
@@ -5700,10 +5800,10 @@
       </p:sp>
       <p:sp>
         <p:nvSpPr>
-          <p:cNvPr id="185" name="テキスト ボックス 184">
-            <a:extLst>
-              <a:ext uri="{FF2B5EF4-FFF2-40B4-BE49-F238E27FC236}">
-                <a16:creationId xmlns:a16="http://schemas.microsoft.com/office/drawing/2014/main" id="{07252E8E-9C58-4A3F-A4FF-6E75CD24313B}"/>
+          <p:cNvPr id="309" name="テキスト ボックス 308">
+            <a:extLst>
+              <a:ext uri="{FF2B5EF4-FFF2-40B4-BE49-F238E27FC236}">
+                <a16:creationId xmlns:a16="http://schemas.microsoft.com/office/drawing/2014/main" id="{D88EED32-B0ED-4B4B-9FBE-50CF6F0E171D}"/>
               </a:ext>
             </a:extLst>
           </p:cNvPr>
@@ -5712,8 +5812,8 @@
         </p:nvSpPr>
         <p:spPr>
           <a:xfrm>
-            <a:off x="4407718" y="1842666"/>
-            <a:ext cx="885179" cy="369332"/>
+            <a:off x="554571" y="1560522"/>
+            <a:ext cx="957313" cy="369332"/>
           </a:xfrm>
           <a:prstGeom prst="rect">
             <a:avLst/>
@@ -5727,108 +5827,14 @@
           <a:lstStyle/>
           <a:p>
             <a:r>
-              <a:rPr lang="en-US" altLang="ja-JP">
-                <a:solidFill>
-                  <a:schemeClr val="accent2"/>
-                </a:solidFill>
-              </a:rPr>
-              <a:t>&lt;heap&gt;</a:t>
-            </a:r>
-            <a:endParaRPr kumimoji="1" lang="ja-JP" altLang="en-US">
-              <a:solidFill>
-                <a:schemeClr val="accent2"/>
-              </a:solidFill>
-            </a:endParaRPr>
-          </a:p>
-        </p:txBody>
-      </p:sp>
-      <p:cxnSp>
-        <p:nvCxnSpPr>
-          <p:cNvPr id="241" name="コネクタ: カギ線 240">
-            <a:extLst>
-              <a:ext uri="{FF2B5EF4-FFF2-40B4-BE49-F238E27FC236}">
-                <a16:creationId xmlns:a16="http://schemas.microsoft.com/office/drawing/2014/main" id="{AA69F0CC-6913-438B-9EB8-6A358C4E8AD8}"/>
-              </a:ext>
-            </a:extLst>
-          </p:cNvPr>
-          <p:cNvCxnSpPr>
-            <a:cxnSpLocks/>
-            <a:stCxn id="1017" idx="0"/>
-            <a:endCxn id="161" idx="1"/>
-          </p:cNvCxnSpPr>
-          <p:nvPr/>
-        </p:nvCxnSpPr>
-        <p:spPr>
-          <a:xfrm rot="16200000" flipV="1">
-            <a:off x="10163411" y="380085"/>
-            <a:ext cx="1096809" cy="920965"/>
-          </a:xfrm>
-          <a:prstGeom prst="bentConnector4">
-            <a:avLst>
-              <a:gd name="adj1" fmla="val 24985"/>
-              <a:gd name="adj2" fmla="val 250770"/>
-            </a:avLst>
-          </a:prstGeom>
-          <a:ln w="9525">
-            <a:solidFill>
-              <a:srgbClr val="6600CC"/>
-            </a:solidFill>
-            <a:prstDash val="lgDash"/>
-            <a:headEnd type="triangle" w="med" len="med"/>
-            <a:tailEnd type="triangle" w="med" len="med"/>
-          </a:ln>
-        </p:spPr>
-        <p:style>
-          <a:lnRef idx="1">
-            <a:schemeClr val="accent1"/>
-          </a:lnRef>
-          <a:fillRef idx="0">
-            <a:schemeClr val="accent1"/>
-          </a:fillRef>
-          <a:effectRef idx="0">
-            <a:schemeClr val="accent1"/>
-          </a:effectRef>
-          <a:fontRef idx="minor">
-            <a:schemeClr val="tx1"/>
-          </a:fontRef>
-        </p:style>
-      </p:cxnSp>
-      <p:sp>
-        <p:nvSpPr>
-          <p:cNvPr id="258" name="テキスト ボックス 257">
-            <a:extLst>
-              <a:ext uri="{FF2B5EF4-FFF2-40B4-BE49-F238E27FC236}">
-                <a16:creationId xmlns:a16="http://schemas.microsoft.com/office/drawing/2014/main" id="{C990EF96-3AE4-45F5-88AF-38D34B93A536}"/>
-              </a:ext>
-            </a:extLst>
-          </p:cNvPr>
-          <p:cNvSpPr txBox="1"/>
-          <p:nvPr/>
-        </p:nvSpPr>
-        <p:spPr>
-          <a:xfrm>
-            <a:off x="8817541" y="-36144"/>
-            <a:ext cx="1433790" cy="369332"/>
-          </a:xfrm>
-          <a:prstGeom prst="rect">
-            <a:avLst/>
-          </a:prstGeom>
-        </p:spPr>
-        <p:txBody>
-          <a:bodyPr wrap="none" rtlCol="0">
-            <a:spAutoFit/>
-          </a:bodyPr>
-          <a:lstStyle/>
-          <a:p>
-            <a:r>
-              <a:rPr lang="en-US" altLang="ja-JP">
+              <a:rPr kumimoji="1" lang="en-US" altLang="ja-JP">
                 <a:solidFill>
                   <a:schemeClr val="bg1">
                     <a:lumMod val="75000"/>
                   </a:schemeClr>
                 </a:solidFill>
               </a:rPr>
-              <a:t>&lt;immutable&gt;</a:t>
+              <a:t>&lt;single&gt;</a:t>
             </a:r>
             <a:endParaRPr kumimoji="1" lang="ja-JP" altLang="en-US">
               <a:solidFill>
@@ -5842,10 +5848,10 @@
       </p:sp>
       <p:sp>
         <p:nvSpPr>
-          <p:cNvPr id="291" name="テキスト ボックス 290">
-            <a:extLst>
-              <a:ext uri="{FF2B5EF4-FFF2-40B4-BE49-F238E27FC236}">
-                <a16:creationId xmlns:a16="http://schemas.microsoft.com/office/drawing/2014/main" id="{22BC25F5-15D0-44A9-BC67-9B2BB2747FE4}"/>
+          <p:cNvPr id="320" name="テキスト ボックス 319">
+            <a:extLst>
+              <a:ext uri="{FF2B5EF4-FFF2-40B4-BE49-F238E27FC236}">
+                <a16:creationId xmlns:a16="http://schemas.microsoft.com/office/drawing/2014/main" id="{F8F6F5FF-6315-4D66-ACE9-311EDEC7A43B}"/>
               </a:ext>
             </a:extLst>
           </p:cNvPr>
@@ -5854,25 +5860,44 @@
         </p:nvSpPr>
         <p:spPr>
           <a:xfrm>
-            <a:off x="4021720" y="2881249"/>
-            <a:ext cx="1005840" cy="369332"/>
+            <a:off x="9966418" y="5617840"/>
+            <a:ext cx="2090179" cy="369332"/>
           </a:xfrm>
           <a:prstGeom prst="rect">
             <a:avLst/>
           </a:prstGeom>
           <a:noFill/>
-          <a:ln>
-            <a:solidFill>
-              <a:schemeClr val="accent4"/>
-            </a:solidFill>
-          </a:ln>
-        </p:spPr>
-        <p:txBody>
-          <a:bodyPr wrap="none" rtlCol="0">
+        </p:spPr>
+        <p:txBody>
+          <a:bodyPr wrap="square" rtlCol="0">
             <a:spAutoFit/>
           </a:bodyPr>
           <a:lstStyle/>
           <a:p>
+            <a:r>
+              <a:rPr kumimoji="1" lang="en-US" altLang="ja-JP">
+                <a:solidFill>
+                  <a:schemeClr val="accent6"/>
+                </a:solidFill>
+              </a:rPr>
+              <a:t>Arc&lt;</a:t>
+            </a:r>
+            <a:r>
+              <a:rPr kumimoji="1" lang="en-US" altLang="ja-JP" err="1">
+                <a:solidFill>
+                  <a:schemeClr val="accent4"/>
+                </a:solidFill>
+              </a:rPr>
+              <a:t>AtomicT</a:t>
+            </a:r>
+            <a:r>
+              <a:rPr kumimoji="1" lang="en-US" altLang="ja-JP">
+                <a:solidFill>
+                  <a:schemeClr val="accent6"/>
+                </a:solidFill>
+              </a:rPr>
+              <a:t>&gt;</a:t>
+            </a:r>
             <a:r>
               <a:rPr kumimoji="1" lang="en-US" altLang="ja-JP">
                 <a:solidFill>
@@ -5881,202 +5906,19 @@
                   </a:schemeClr>
                 </a:solidFill>
               </a:rPr>
-              <a:t>Mutable</a:t>
+              <a:t> </a:t>
+            </a:r>
+            <a:r>
+              <a:rPr kumimoji="1" lang="en-US" altLang="ja-JP" baseline="30000">
+                <a:solidFill>
+                  <a:srgbClr val="818181"/>
+                </a:solidFill>
+              </a:rPr>
+              <a:t>(†2)</a:t>
             </a:r>
             <a:endParaRPr kumimoji="1" lang="ja-JP" altLang="en-US">
               <a:solidFill>
-                <a:schemeClr val="bg1">
-                  <a:lumMod val="75000"/>
-                </a:schemeClr>
-              </a:solidFill>
-            </a:endParaRPr>
-          </a:p>
-        </p:txBody>
-      </p:sp>
-      <p:sp>
-        <p:nvSpPr>
-          <p:cNvPr id="309" name="テキスト ボックス 308">
-            <a:extLst>
-              <a:ext uri="{FF2B5EF4-FFF2-40B4-BE49-F238E27FC236}">
-                <a16:creationId xmlns:a16="http://schemas.microsoft.com/office/drawing/2014/main" id="{D88EED32-B0ED-4B4B-9FBE-50CF6F0E171D}"/>
-              </a:ext>
-            </a:extLst>
-          </p:cNvPr>
-          <p:cNvSpPr txBox="1"/>
-          <p:nvPr/>
-        </p:nvSpPr>
-        <p:spPr>
-          <a:xfrm>
-            <a:off x="554571" y="1560522"/>
-            <a:ext cx="957313" cy="369332"/>
-          </a:xfrm>
-          <a:prstGeom prst="rect">
-            <a:avLst/>
-          </a:prstGeom>
-          <a:noFill/>
-        </p:spPr>
-        <p:txBody>
-          <a:bodyPr wrap="none" rtlCol="0">
-            <a:spAutoFit/>
-          </a:bodyPr>
-          <a:lstStyle/>
-          <a:p>
-            <a:r>
-              <a:rPr kumimoji="1" lang="en-US" altLang="ja-JP">
-                <a:solidFill>
-                  <a:schemeClr val="bg1">
-                    <a:lumMod val="75000"/>
-                  </a:schemeClr>
-                </a:solidFill>
-              </a:rPr>
-              <a:t>&lt;single&gt;</a:t>
-            </a:r>
-            <a:endParaRPr kumimoji="1" lang="ja-JP" altLang="en-US">
-              <a:solidFill>
-                <a:schemeClr val="bg1">
-                  <a:lumMod val="75000"/>
-                </a:schemeClr>
-              </a:solidFill>
-            </a:endParaRPr>
-          </a:p>
-        </p:txBody>
-      </p:sp>
-      <p:sp>
-        <p:nvSpPr>
-          <p:cNvPr id="315" name="テキスト ボックス 314">
-            <a:extLst>
-              <a:ext uri="{FF2B5EF4-FFF2-40B4-BE49-F238E27FC236}">
-                <a16:creationId xmlns:a16="http://schemas.microsoft.com/office/drawing/2014/main" id="{203C443B-0C4C-4DF2-A204-58E594702A3A}"/>
-              </a:ext>
-            </a:extLst>
-          </p:cNvPr>
-          <p:cNvSpPr txBox="1"/>
-          <p:nvPr/>
-        </p:nvSpPr>
-        <p:spPr>
-          <a:xfrm>
-            <a:off x="8823964" y="343912"/>
-            <a:ext cx="1082348" cy="369332"/>
-          </a:xfrm>
-          <a:prstGeom prst="rect">
-            <a:avLst/>
-          </a:prstGeom>
-        </p:spPr>
-        <p:txBody>
-          <a:bodyPr wrap="none" rtlCol="0">
-            <a:spAutoFit/>
-          </a:bodyPr>
-          <a:lstStyle/>
-          <a:p>
-            <a:r>
-              <a:rPr lang="en-US" altLang="ja-JP">
-                <a:solidFill>
-                  <a:schemeClr val="accent4"/>
-                </a:solidFill>
-              </a:rPr>
-              <a:t>&lt;mut&gt;</a:t>
-            </a:r>
-            <a:r>
-              <a:rPr kumimoji="1" lang="en-US" altLang="ja-JP" baseline="30000">
-                <a:solidFill>
-                  <a:schemeClr val="accent4"/>
-                </a:solidFill>
-              </a:rPr>
-              <a:t> </a:t>
-            </a:r>
-            <a:r>
-              <a:rPr kumimoji="1" lang="en-US" altLang="ja-JP" baseline="30000">
-                <a:solidFill>
-                  <a:schemeClr val="bg2">
-                    <a:lumMod val="50000"/>
-                  </a:schemeClr>
-                </a:solidFill>
-              </a:rPr>
-              <a:t>(†1)</a:t>
-            </a:r>
-            <a:endParaRPr kumimoji="1" lang="ja-JP" altLang="en-US">
-              <a:solidFill>
-                <a:srgbClr val="6600CC"/>
-              </a:solidFill>
-            </a:endParaRPr>
-          </a:p>
-        </p:txBody>
-      </p:sp>
-      <p:sp>
-        <p:nvSpPr>
-          <p:cNvPr id="320" name="テキスト ボックス 319">
-            <a:extLst>
-              <a:ext uri="{FF2B5EF4-FFF2-40B4-BE49-F238E27FC236}">
-                <a16:creationId xmlns:a16="http://schemas.microsoft.com/office/drawing/2014/main" id="{F8F6F5FF-6315-4D66-ACE9-311EDEC7A43B}"/>
-              </a:ext>
-            </a:extLst>
-          </p:cNvPr>
-          <p:cNvSpPr txBox="1"/>
-          <p:nvPr/>
-        </p:nvSpPr>
-        <p:spPr>
-          <a:xfrm>
-            <a:off x="10251332" y="5617840"/>
-            <a:ext cx="2070573" cy="369332"/>
-          </a:xfrm>
-          <a:prstGeom prst="rect">
-            <a:avLst/>
-          </a:prstGeom>
-          <a:noFill/>
-        </p:spPr>
-        <p:txBody>
-          <a:bodyPr wrap="square" rtlCol="0">
-            <a:spAutoFit/>
-          </a:bodyPr>
-          <a:lstStyle/>
-          <a:p>
-            <a:r>
-              <a:rPr kumimoji="1" lang="en-US" altLang="ja-JP">
-                <a:solidFill>
-                  <a:schemeClr val="accent6"/>
-                </a:solidFill>
-              </a:rPr>
-              <a:t>Arc&lt;</a:t>
-            </a:r>
-            <a:r>
-              <a:rPr kumimoji="1" lang="en-US" altLang="ja-JP" err="1">
-                <a:solidFill>
-                  <a:schemeClr val="accent4"/>
-                </a:solidFill>
-              </a:rPr>
-              <a:t>AtomicT</a:t>
-            </a:r>
-            <a:r>
-              <a:rPr kumimoji="1" lang="en-US" altLang="ja-JP">
-                <a:solidFill>
-                  <a:schemeClr val="accent6"/>
-                </a:solidFill>
-              </a:rPr>
-              <a:t>&gt;</a:t>
-            </a:r>
-            <a:r>
-              <a:rPr kumimoji="1" lang="en-US" altLang="ja-JP">
-                <a:solidFill>
-                  <a:schemeClr val="bg1">
-                    <a:lumMod val="75000"/>
-                  </a:schemeClr>
-                </a:solidFill>
-              </a:rPr>
-              <a:t> </a:t>
-            </a:r>
-            <a:r>
-              <a:rPr kumimoji="1" lang="en-US" altLang="ja-JP" baseline="30000">
-                <a:solidFill>
-                  <a:schemeClr val="bg2">
-                    <a:lumMod val="50000"/>
-                  </a:schemeClr>
-                </a:solidFill>
-              </a:rPr>
-              <a:t>(†2)</a:t>
-            </a:r>
-            <a:endParaRPr kumimoji="1" lang="ja-JP" altLang="en-US">
-              <a:solidFill>
-                <a:schemeClr val="accent6"/>
+                <a:srgbClr val="818181"/>
               </a:solidFill>
             </a:endParaRPr>
           </a:p>
@@ -6100,7 +5942,7 @@
         </p:nvCxnSpPr>
         <p:spPr>
           <a:xfrm>
-            <a:off x="6093785" y="6194771"/>
+            <a:off x="5933510" y="6194771"/>
             <a:ext cx="1960538" cy="619"/>
           </a:xfrm>
           <a:prstGeom prst="bentConnector3">
@@ -6150,8 +5992,8 @@
         </p:nvCxnSpPr>
         <p:spPr>
           <a:xfrm rot="16200000" flipH="1">
-            <a:off x="7919081" y="4251814"/>
-            <a:ext cx="204629" cy="4459873"/>
+            <a:off x="7696487" y="4314134"/>
+            <a:ext cx="204629" cy="4335234"/>
           </a:xfrm>
           <a:prstGeom prst="bentConnector2">
             <a:avLst/>
@@ -6192,7 +6034,7 @@
         </p:nvSpPr>
         <p:spPr>
           <a:xfrm>
-            <a:off x="8754132" y="5473274"/>
+            <a:off x="8593857" y="5473274"/>
             <a:ext cx="1189236" cy="369332"/>
           </a:xfrm>
           <a:prstGeom prst="rect">
@@ -6256,8 +6098,8 @@
         </p:nvCxnSpPr>
         <p:spPr>
           <a:xfrm rot="5400000" flipH="1" flipV="1">
-            <a:off x="9208738" y="4968131"/>
-            <a:ext cx="208218" cy="1876969"/>
+            <a:off x="8986144" y="5030450"/>
+            <a:ext cx="208218" cy="1752330"/>
           </a:xfrm>
           <a:prstGeom prst="bentConnector2">
             <a:avLst/>
@@ -6302,8 +6144,8 @@
         </p:nvCxnSpPr>
         <p:spPr>
           <a:xfrm flipV="1">
-            <a:off x="8694403" y="6193286"/>
-            <a:ext cx="1556929" cy="2104"/>
+            <a:off x="8534128" y="6193286"/>
+            <a:ext cx="1432290" cy="2104"/>
           </a:xfrm>
           <a:prstGeom prst="bentConnector3">
             <a:avLst>
@@ -6348,7 +6190,7 @@
         </p:nvSpPr>
         <p:spPr>
           <a:xfrm>
-            <a:off x="6123650" y="6268328"/>
+            <a:off x="5963375" y="6268328"/>
             <a:ext cx="1779782" cy="369332"/>
           </a:xfrm>
           <a:prstGeom prst="rect">
@@ -6392,7 +6234,7 @@
         </p:nvSpPr>
         <p:spPr>
           <a:xfrm>
-            <a:off x="8754132" y="5849562"/>
+            <a:off x="8593857" y="5849562"/>
             <a:ext cx="747833" cy="369332"/>
           </a:xfrm>
           <a:prstGeom prst="rect">
@@ -6440,7 +6282,7 @@
         </p:nvSpPr>
         <p:spPr>
           <a:xfrm>
-            <a:off x="4987988" y="2755622"/>
+            <a:off x="4929700" y="2755622"/>
             <a:ext cx="1433790" cy="369332"/>
           </a:xfrm>
           <a:prstGeom prst="rect">
@@ -6487,7 +6329,7 @@
         </p:nvSpPr>
         <p:spPr>
           <a:xfrm>
-            <a:off x="4419169" y="3780672"/>
+            <a:off x="4360881" y="3780672"/>
             <a:ext cx="798617" cy="369332"/>
           </a:xfrm>
           <a:prstGeom prst="rect">
@@ -6534,8 +6376,8 @@
         </p:nvCxnSpPr>
         <p:spPr>
           <a:xfrm rot="16200000" flipH="1">
-            <a:off x="5980822" y="1794399"/>
-            <a:ext cx="595213" cy="3507576"/>
+            <a:off x="5871540" y="1845392"/>
+            <a:ext cx="595213" cy="3405589"/>
           </a:xfrm>
           <a:prstGeom prst="bentConnector2">
             <a:avLst/>
@@ -6580,8 +6422,8 @@
         </p:nvCxnSpPr>
         <p:spPr>
           <a:xfrm rot="5400000" flipH="1" flipV="1">
-            <a:off x="9197089" y="2606885"/>
-            <a:ext cx="203302" cy="1905184"/>
+            <a:off x="8974494" y="2669205"/>
+            <a:ext cx="203302" cy="1780545"/>
           </a:xfrm>
           <a:prstGeom prst="bentConnector2">
             <a:avLst/>
@@ -6626,8 +6468,8 @@
         </p:nvCxnSpPr>
         <p:spPr>
           <a:xfrm>
-            <a:off x="8660080" y="3845794"/>
-            <a:ext cx="1591252" cy="2812"/>
+            <a:off x="8499805" y="3845794"/>
+            <a:ext cx="1466613" cy="2812"/>
           </a:xfrm>
           <a:prstGeom prst="bentConnector3">
             <a:avLst>
@@ -6672,7 +6514,7 @@
         </p:nvSpPr>
         <p:spPr>
           <a:xfrm>
-            <a:off x="8032216" y="2493313"/>
+            <a:off x="7871941" y="2105070"/>
             <a:ext cx="627864" cy="369332"/>
           </a:xfrm>
           <a:prstGeom prst="rect">
@@ -6729,8 +6571,8 @@
         </p:nvCxnSpPr>
         <p:spPr>
           <a:xfrm flipV="1">
-            <a:off x="8660080" y="2676266"/>
-            <a:ext cx="1591252" cy="1713"/>
+            <a:off x="8499805" y="2287786"/>
+            <a:ext cx="1466613" cy="1950"/>
           </a:xfrm>
           <a:prstGeom prst="bentConnector3">
             <a:avLst>
@@ -6775,7 +6617,7 @@
         </p:nvSpPr>
         <p:spPr>
           <a:xfrm>
-            <a:off x="8054323" y="4442432"/>
+            <a:off x="7894048" y="4442432"/>
             <a:ext cx="640080" cy="369332"/>
           </a:xfrm>
           <a:prstGeom prst="rect">
@@ -6850,8 +6692,8 @@
         </p:nvCxnSpPr>
         <p:spPr>
           <a:xfrm rot="5400000" flipH="1" flipV="1">
-            <a:off x="9211324" y="3402425"/>
-            <a:ext cx="203046" cy="1876969"/>
+            <a:off x="8988730" y="3464744"/>
+            <a:ext cx="203046" cy="1752330"/>
           </a:xfrm>
           <a:prstGeom prst="bentConnector2">
             <a:avLst/>
@@ -6896,8 +6738,8 @@
         </p:nvCxnSpPr>
         <p:spPr>
           <a:xfrm>
-            <a:off x="8694403" y="4627098"/>
-            <a:ext cx="1556929" cy="3068"/>
+            <a:off x="8534128" y="4627098"/>
+            <a:ext cx="1432290" cy="3068"/>
           </a:xfrm>
           <a:prstGeom prst="bentConnector3">
             <a:avLst>
@@ -6942,7 +6784,7 @@
         </p:nvSpPr>
         <p:spPr>
           <a:xfrm>
-            <a:off x="8750739" y="3126903"/>
+            <a:off x="8590464" y="3126903"/>
             <a:ext cx="1356910" cy="369332"/>
           </a:xfrm>
           <a:prstGeom prst="rect">
@@ -6988,7 +6830,7 @@
         </p:nvSpPr>
         <p:spPr>
           <a:xfrm>
-            <a:off x="8750739" y="3519257"/>
+            <a:off x="8590464" y="3519257"/>
             <a:ext cx="747833" cy="369332"/>
           </a:xfrm>
           <a:prstGeom prst="rect">
@@ -7038,7 +6880,7 @@
         </p:nvSpPr>
         <p:spPr>
           <a:xfrm>
-            <a:off x="5489132" y="4439991"/>
+            <a:off x="5328857" y="4439991"/>
             <a:ext cx="604653" cy="369332"/>
           </a:xfrm>
           <a:prstGeom prst="rect">
@@ -7095,7 +6937,7 @@
         </p:nvCxnSpPr>
         <p:spPr>
           <a:xfrm>
-            <a:off x="6093785" y="4624657"/>
+            <a:off x="5933510" y="4624657"/>
             <a:ext cx="1960538" cy="2441"/>
           </a:xfrm>
           <a:prstGeom prst="bentConnector3">
@@ -7145,8 +6987,8 @@
         </p:nvCxnSpPr>
         <p:spPr>
           <a:xfrm rot="16200000" flipH="1">
-            <a:off x="7915584" y="2685197"/>
-            <a:ext cx="211623" cy="4459873"/>
+            <a:off x="7692990" y="2747517"/>
+            <a:ext cx="211623" cy="4335234"/>
           </a:xfrm>
           <a:prstGeom prst="bentConnector2">
             <a:avLst/>
@@ -7187,7 +7029,7 @@
         </p:nvSpPr>
         <p:spPr>
           <a:xfrm>
-            <a:off x="8754132" y="3933383"/>
+            <a:off x="8593857" y="3933383"/>
             <a:ext cx="1189236" cy="369332"/>
           </a:xfrm>
           <a:prstGeom prst="rect">
@@ -7247,7 +7089,7 @@
         </p:nvSpPr>
         <p:spPr>
           <a:xfrm>
-            <a:off x="8754132" y="4311897"/>
+            <a:off x="8593857" y="4311897"/>
             <a:ext cx="747833" cy="369332"/>
           </a:xfrm>
           <a:prstGeom prst="rect">
@@ -7295,7 +7137,7 @@
         </p:nvSpPr>
         <p:spPr>
           <a:xfrm>
-            <a:off x="8750739" y="1968370"/>
+            <a:off x="8590464" y="1567121"/>
             <a:ext cx="1356910" cy="369332"/>
           </a:xfrm>
           <a:prstGeom prst="rect">
@@ -7341,7 +7183,7 @@
         </p:nvSpPr>
         <p:spPr>
           <a:xfrm>
-            <a:off x="8750739" y="2334904"/>
+            <a:off x="8590464" y="1933655"/>
             <a:ext cx="747833" cy="369332"/>
           </a:xfrm>
           <a:prstGeom prst="rect">
@@ -7389,14 +7231,14 @@
           <p:cNvCxnSpPr>
             <a:cxnSpLocks/>
             <a:stCxn id="119" idx="2"/>
-            <a:endCxn id="730" idx="1"/>
+            <a:endCxn id="169" idx="1"/>
           </p:cNvCxnSpPr>
           <p:nvPr/>
         </p:nvCxnSpPr>
         <p:spPr>
           <a:xfrm rot="16200000" flipH="1">
-            <a:off x="5089241" y="1127782"/>
-            <a:ext cx="164000" cy="1364759"/>
+            <a:off x="6722087" y="-563352"/>
+            <a:ext cx="952816" cy="5535843"/>
           </a:xfrm>
           <a:prstGeom prst="bentConnector2">
             <a:avLst/>
@@ -7437,7 +7279,7 @@
         </p:nvSpPr>
         <p:spPr>
           <a:xfrm>
-            <a:off x="6123650" y="4293695"/>
+            <a:off x="5963375" y="4293695"/>
             <a:ext cx="1693990" cy="369332"/>
           </a:xfrm>
           <a:prstGeom prst="rect">
@@ -7485,7 +7327,7 @@
         </p:nvSpPr>
         <p:spPr>
           <a:xfrm>
-            <a:off x="6123650" y="4703681"/>
+            <a:off x="5963375" y="4703681"/>
             <a:ext cx="1779782" cy="369332"/>
           </a:xfrm>
           <a:prstGeom prst="rect">
@@ -7529,7 +7371,7 @@
         </p:nvSpPr>
         <p:spPr>
           <a:xfrm>
-            <a:off x="9733501" y="803337"/>
+            <a:off x="9631901" y="803337"/>
             <a:ext cx="1553117" cy="369332"/>
           </a:xfrm>
           <a:prstGeom prst="rect">
@@ -7545,14 +7387,14 @@
             <a:r>
               <a:rPr lang="en-US" altLang="ja-JP">
                 <a:solidFill>
-                  <a:srgbClr val="6600CC"/>
+                  <a:srgbClr val="996633"/>
                 </a:solidFill>
               </a:rPr>
               <a:t>&lt;&amp;ref|*deref&gt;</a:t>
             </a:r>
             <a:endParaRPr kumimoji="1" lang="ja-JP" altLang="en-US">
               <a:solidFill>
-                <a:srgbClr val="6600CC"/>
+                <a:srgbClr val="996633"/>
               </a:solidFill>
             </a:endParaRPr>
           </a:p>
@@ -7572,7 +7414,7 @@
         </p:nvSpPr>
         <p:spPr>
           <a:xfrm>
-            <a:off x="5853621" y="1707496"/>
+            <a:off x="5693346" y="1358526"/>
             <a:ext cx="1910075" cy="369332"/>
           </a:xfrm>
           <a:prstGeom prst="rect">
@@ -7623,14 +7465,14 @@
           <p:cNvCxnSpPr>
             <a:cxnSpLocks/>
             <a:stCxn id="730" idx="3"/>
-            <a:endCxn id="169" idx="1"/>
+            <a:endCxn id="5" idx="1"/>
           </p:cNvCxnSpPr>
           <p:nvPr/>
         </p:nvCxnSpPr>
         <p:spPr>
           <a:xfrm>
-            <a:off x="7763696" y="1892162"/>
-            <a:ext cx="2487636" cy="2544"/>
+            <a:off x="7603421" y="1543192"/>
+            <a:ext cx="2362997" cy="2174"/>
           </a:xfrm>
           <a:prstGeom prst="bentConnector3">
             <a:avLst>
@@ -7679,8 +7521,8 @@
         </p:nvCxnSpPr>
         <p:spPr>
           <a:xfrm rot="16200000" flipH="1">
-            <a:off x="7119862" y="1765624"/>
-            <a:ext cx="601151" cy="1223557"/>
+            <a:off x="6979223" y="1397018"/>
+            <a:ext cx="561878" cy="1223557"/>
           </a:xfrm>
           <a:prstGeom prst="bentConnector2">
             <a:avLst/>
@@ -7721,7 +7563,7 @@
         </p:nvSpPr>
         <p:spPr>
           <a:xfrm>
-            <a:off x="7742618" y="1580214"/>
+            <a:off x="7582343" y="1239030"/>
             <a:ext cx="1263487" cy="369332"/>
           </a:xfrm>
           <a:prstGeom prst="rect">
@@ -7768,7 +7610,7 @@
         </p:nvSpPr>
         <p:spPr>
           <a:xfrm>
-            <a:off x="6774001" y="2084313"/>
+            <a:off x="6569555" y="2216831"/>
             <a:ext cx="889987" cy="369332"/>
           </a:xfrm>
           <a:prstGeom prst="rect">
@@ -7814,7 +7656,7 @@
         </p:nvSpPr>
         <p:spPr>
           <a:xfrm>
-            <a:off x="6454161" y="92916"/>
+            <a:off x="6196034" y="22243"/>
             <a:ext cx="2317204" cy="1323439"/>
           </a:xfrm>
           <a:prstGeom prst="rect">
@@ -7831,9 +7673,7 @@
             <a:r>
               <a:rPr kumimoji="1" lang="en-US" altLang="ja-JP" sz="1000">
                 <a:solidFill>
-                  <a:schemeClr val="bg2">
-                    <a:lumMod val="50000"/>
-                  </a:schemeClr>
+                  <a:srgbClr val="818181"/>
                 </a:solidFill>
               </a:rPr>
               <a:t>(†1): `</a:t>
@@ -7849,9 +7689,7 @@
             <a:r>
               <a:rPr kumimoji="1" lang="en-US" altLang="ja-JP" sz="1000">
                 <a:solidFill>
-                  <a:schemeClr val="bg2">
-                    <a:lumMod val="50000"/>
-                  </a:schemeClr>
+                  <a:srgbClr val="818181"/>
                 </a:solidFill>
               </a:rPr>
               <a:t> T` is </a:t>
@@ -7859,9 +7697,7 @@
             <a:r>
               <a:rPr kumimoji="1" lang="en-US" altLang="ja-JP" sz="1000" u="sng">
                 <a:solidFill>
-                  <a:schemeClr val="bg2">
-                    <a:lumMod val="50000"/>
-                  </a:schemeClr>
+                  <a:srgbClr val="818181"/>
                 </a:solidFill>
               </a:rPr>
               <a:t>not a Type</a:t>
@@ -7869,9 +7705,7 @@
             <a:r>
               <a:rPr kumimoji="1" lang="en-US" altLang="ja-JP" sz="1000">
                 <a:solidFill>
-                  <a:schemeClr val="bg2">
-                    <a:lumMod val="50000"/>
-                  </a:schemeClr>
+                  <a:srgbClr val="818181"/>
                 </a:solidFill>
               </a:rPr>
               <a:t>, this suggestion means to “be use the `mut` keyword like a `let </a:t>
@@ -7887,9 +7721,7 @@
             <a:r>
               <a:rPr kumimoji="1" lang="en-US" altLang="ja-JP" sz="1000">
                 <a:solidFill>
-                  <a:schemeClr val="bg2">
-                    <a:lumMod val="50000"/>
-                  </a:schemeClr>
+                  <a:srgbClr val="818181"/>
                 </a:solidFill>
               </a:rPr>
               <a:t> x: T` for your binding if it needs mutability”.</a:t>
@@ -7898,9 +7730,7 @@
           <a:p>
             <a:endParaRPr kumimoji="1" lang="en-US" altLang="ja-JP" sz="1000">
               <a:solidFill>
-                <a:schemeClr val="bg2">
-                  <a:lumMod val="50000"/>
-                </a:schemeClr>
+                <a:srgbClr val="818181"/>
               </a:solidFill>
             </a:endParaRPr>
           </a:p>
@@ -7908,9 +7738,7 @@
             <a:r>
               <a:rPr kumimoji="1" lang="en-US" altLang="ja-JP" sz="1000">
                 <a:solidFill>
-                  <a:schemeClr val="bg2">
-                    <a:lumMod val="50000"/>
-                  </a:schemeClr>
+                  <a:srgbClr val="818181"/>
                 </a:solidFill>
               </a:rPr>
               <a:t>(†2): `</a:t>
@@ -7918,9 +7746,7 @@
             <a:r>
               <a:rPr kumimoji="1" lang="en-US" altLang="ja-JP" sz="1000" err="1">
                 <a:solidFill>
-                  <a:schemeClr val="bg2">
-                    <a:lumMod val="50000"/>
-                  </a:schemeClr>
+                  <a:srgbClr val="818181"/>
                 </a:solidFill>
               </a:rPr>
               <a:t>bool|int</a:t>
@@ -7928,9 +7754,7 @@
             <a:r>
               <a:rPr kumimoji="1" lang="en-US" altLang="ja-JP" sz="1000">
                 <a:solidFill>
-                  <a:schemeClr val="bg2">
-                    <a:lumMod val="50000"/>
-                  </a:schemeClr>
+                  <a:srgbClr val="818181"/>
                 </a:solidFill>
               </a:rPr>
               <a:t>` means to “Boolean or Integral” that is Bool, I8, I16, I32, I64, </a:t>
@@ -7938,9 +7762,7 @@
             <a:r>
               <a:rPr kumimoji="1" lang="en-US" altLang="ja-JP" sz="1000" err="1">
                 <a:solidFill>
-                  <a:schemeClr val="bg2">
-                    <a:lumMod val="50000"/>
-                  </a:schemeClr>
+                  <a:srgbClr val="818181"/>
                 </a:solidFill>
               </a:rPr>
               <a:t>Isize</a:t>
@@ -7948,9 +7770,7 @@
             <a:r>
               <a:rPr kumimoji="1" lang="en-US" altLang="ja-JP" sz="1000">
                 <a:solidFill>
-                  <a:schemeClr val="bg2">
-                    <a:lumMod val="50000"/>
-                  </a:schemeClr>
+                  <a:srgbClr val="818181"/>
                 </a:solidFill>
               </a:rPr>
               <a:t>, U8, U16, U32, U64, </a:t>
@@ -7958,9 +7778,7 @@
             <a:r>
               <a:rPr kumimoji="1" lang="en-US" altLang="ja-JP" sz="1000" err="1">
                 <a:solidFill>
-                  <a:schemeClr val="bg2">
-                    <a:lumMod val="50000"/>
-                  </a:schemeClr>
+                  <a:srgbClr val="818181"/>
                 </a:solidFill>
               </a:rPr>
               <a:t>Usize</a:t>
@@ -7968,9 +7786,7 @@
             <a:r>
               <a:rPr kumimoji="1" lang="en-US" altLang="ja-JP" sz="1000">
                 <a:solidFill>
-                  <a:schemeClr val="bg2">
-                    <a:lumMod val="50000"/>
-                  </a:schemeClr>
+                  <a:srgbClr val="818181"/>
                 </a:solidFill>
               </a:rPr>
               <a:t> and </a:t>
@@ -7978,9 +7794,7 @@
             <a:r>
               <a:rPr kumimoji="1" lang="en-US" altLang="ja-JP" sz="1000" err="1">
                 <a:solidFill>
-                  <a:schemeClr val="bg2">
-                    <a:lumMod val="50000"/>
-                  </a:schemeClr>
+                  <a:srgbClr val="818181"/>
                 </a:solidFill>
               </a:rPr>
               <a:t>Ptr</a:t>
@@ -7988,9 +7802,7 @@
             <a:r>
               <a:rPr kumimoji="1" lang="en-US" altLang="ja-JP" sz="1000">
                 <a:solidFill>
-                  <a:schemeClr val="bg2">
-                    <a:lumMod val="50000"/>
-                  </a:schemeClr>
+                  <a:srgbClr val="818181"/>
                 </a:solidFill>
               </a:rPr>
               <a:t>.</a:t>
@@ -8087,8 +7899,8 @@
         </p:nvCxnSpPr>
         <p:spPr>
           <a:xfrm rot="16200000" flipH="1">
-            <a:off x="2732962" y="1777157"/>
-            <a:ext cx="972416" cy="1605099"/>
+            <a:off x="2703818" y="1806301"/>
+            <a:ext cx="972416" cy="1546811"/>
           </a:xfrm>
           <a:prstGeom prst="bentConnector2">
             <a:avLst/>
@@ -8133,8 +7945,8 @@
         </p:nvCxnSpPr>
         <p:spPr>
           <a:xfrm rot="5400000" flipH="1" flipV="1">
-            <a:off x="3127518" y="832600"/>
-            <a:ext cx="180671" cy="1602464"/>
+            <a:off x="3098374" y="861744"/>
+            <a:ext cx="180671" cy="1544176"/>
           </a:xfrm>
           <a:prstGeom prst="bentConnector2">
             <a:avLst/>
@@ -8277,6 +8089,149 @@
       </p:sp>
       <p:sp>
         <p:nvSpPr>
+          <p:cNvPr id="1086" name="テキスト ボックス 1085">
+            <a:extLst>
+              <a:ext uri="{FF2B5EF4-FFF2-40B4-BE49-F238E27FC236}">
+                <a16:creationId xmlns:a16="http://schemas.microsoft.com/office/drawing/2014/main" id="{7DAF253D-983A-427E-98C3-85CAE131F150}"/>
+              </a:ext>
+            </a:extLst>
+          </p:cNvPr>
+          <p:cNvSpPr txBox="1"/>
+          <p:nvPr/>
+        </p:nvSpPr>
+        <p:spPr>
+          <a:xfrm>
+            <a:off x="156696" y="108401"/>
+            <a:ext cx="5142375" cy="461665"/>
+          </a:xfrm>
+          <a:prstGeom prst="rect">
+            <a:avLst/>
+          </a:prstGeom>
+          <a:noFill/>
+        </p:spPr>
+        <p:txBody>
+          <a:bodyPr wrap="square">
+            <a:spAutoFit/>
+          </a:bodyPr>
+          <a:lstStyle/>
+          <a:p>
+            <a:r>
+              <a:rPr kumimoji="1" lang="en-US" altLang="ja-JP" sz="2400">
+                <a:solidFill>
+                  <a:schemeClr val="bg1">
+                    <a:lumMod val="75000"/>
+                  </a:schemeClr>
+                </a:solidFill>
+              </a:rPr>
+              <a:t>Rust Memory Container Cheat-sheet</a:t>
+            </a:r>
+          </a:p>
+        </p:txBody>
+      </p:sp>
+      <p:cxnSp>
+        <p:nvCxnSpPr>
+          <p:cNvPr id="67" name="コネクタ: カギ線 66">
+            <a:extLst>
+              <a:ext uri="{FF2B5EF4-FFF2-40B4-BE49-F238E27FC236}">
+                <a16:creationId xmlns:a16="http://schemas.microsoft.com/office/drawing/2014/main" id="{61F1768A-F3D5-4FEE-8EDF-FD03934B7A31}"/>
+              </a:ext>
+            </a:extLst>
+          </p:cNvPr>
+          <p:cNvCxnSpPr>
+            <a:cxnSpLocks/>
+            <a:stCxn id="1017" idx="0"/>
+            <a:endCxn id="181" idx="1"/>
+          </p:cNvCxnSpPr>
+          <p:nvPr/>
+        </p:nvCxnSpPr>
+        <p:spPr>
+          <a:xfrm rot="16200000" flipV="1">
+            <a:off x="10150917" y="471486"/>
+            <a:ext cx="732987" cy="1101986"/>
+          </a:xfrm>
+          <a:prstGeom prst="bentConnector4">
+            <a:avLst>
+              <a:gd name="adj1" fmla="val 37403"/>
+              <a:gd name="adj2" fmla="val 223764"/>
+            </a:avLst>
+          </a:prstGeom>
+          <a:ln w="9525">
+            <a:solidFill>
+              <a:srgbClr val="996633"/>
+            </a:solidFill>
+            <a:prstDash val="lgDash"/>
+            <a:headEnd type="triangle" w="med" len="med"/>
+            <a:tailEnd type="triangle" w="med" len="med"/>
+          </a:ln>
+        </p:spPr>
+        <p:style>
+          <a:lnRef idx="1">
+            <a:schemeClr val="accent1"/>
+          </a:lnRef>
+          <a:fillRef idx="0">
+            <a:schemeClr val="accent1"/>
+          </a:fillRef>
+          <a:effectRef idx="0">
+            <a:schemeClr val="accent1"/>
+          </a:effectRef>
+          <a:fontRef idx="minor">
+            <a:schemeClr val="tx1"/>
+          </a:fontRef>
+        </p:style>
+      </p:cxnSp>
+      <p:cxnSp>
+        <p:nvCxnSpPr>
+          <p:cNvPr id="241" name="コネクタ: カギ線 240">
+            <a:extLst>
+              <a:ext uri="{FF2B5EF4-FFF2-40B4-BE49-F238E27FC236}">
+                <a16:creationId xmlns:a16="http://schemas.microsoft.com/office/drawing/2014/main" id="{AA69F0CC-6913-438B-9EB8-6A358C4E8AD8}"/>
+              </a:ext>
+            </a:extLst>
+          </p:cNvPr>
+          <p:cNvCxnSpPr>
+            <a:cxnSpLocks/>
+            <a:stCxn id="1017" idx="0"/>
+            <a:endCxn id="161" idx="1"/>
+          </p:cNvCxnSpPr>
+          <p:nvPr/>
+        </p:nvCxnSpPr>
+        <p:spPr>
+          <a:xfrm rot="16200000" flipV="1">
+            <a:off x="9969006" y="289575"/>
+            <a:ext cx="1096809" cy="1101986"/>
+          </a:xfrm>
+          <a:prstGeom prst="bentConnector4">
+            <a:avLst>
+              <a:gd name="adj1" fmla="val 25069"/>
+              <a:gd name="adj2" fmla="val 223764"/>
+            </a:avLst>
+          </a:prstGeom>
+          <a:ln w="9525">
+            <a:solidFill>
+              <a:srgbClr val="996633"/>
+            </a:solidFill>
+            <a:prstDash val="lgDash"/>
+            <a:headEnd type="triangle" w="med" len="med"/>
+            <a:tailEnd type="triangle" w="med" len="med"/>
+          </a:ln>
+        </p:spPr>
+        <p:style>
+          <a:lnRef idx="1">
+            <a:schemeClr val="accent1"/>
+          </a:lnRef>
+          <a:fillRef idx="0">
+            <a:schemeClr val="accent1"/>
+          </a:fillRef>
+          <a:effectRef idx="0">
+            <a:schemeClr val="accent1"/>
+          </a:effectRef>
+          <a:fontRef idx="minor">
+            <a:schemeClr val="tx1"/>
+          </a:fontRef>
+        </p:style>
+      </p:cxnSp>
+      <p:sp>
+        <p:nvSpPr>
           <p:cNvPr id="1017" name="正方形/長方形 1016">
             <a:extLst>
               <a:ext uri="{FF2B5EF4-FFF2-40B4-BE49-F238E27FC236}">
@@ -8289,8 +8244,8 @@
         </p:nvSpPr>
         <p:spPr>
           <a:xfrm>
-            <a:off x="10308228" y="1388972"/>
-            <a:ext cx="1728137" cy="5376691"/>
+            <a:off x="10023313" y="1388972"/>
+            <a:ext cx="2090179" cy="5376691"/>
           </a:xfrm>
           <a:prstGeom prst="rect">
             <a:avLst/>
@@ -8298,7 +8253,7 @@
           <a:noFill/>
           <a:ln w="9525" cap="flat" cmpd="sng" algn="ctr">
             <a:solidFill>
-              <a:srgbClr val="6600CC"/>
+              <a:srgbClr val="996633"/>
             </a:solidFill>
             <a:prstDash val="lgDash"/>
             <a:round/>
@@ -8331,42 +8286,55 @@
       </p:sp>
       <p:sp>
         <p:nvSpPr>
-          <p:cNvPr id="1086" name="テキスト ボックス 1085">
-            <a:extLst>
-              <a:ext uri="{FF2B5EF4-FFF2-40B4-BE49-F238E27FC236}">
-                <a16:creationId xmlns:a16="http://schemas.microsoft.com/office/drawing/2014/main" id="{7DAF253D-983A-427E-98C3-85CAE131F150}"/>
-              </a:ext>
-            </a:extLst>
-          </p:cNvPr>
-          <p:cNvSpPr txBox="1"/>
-          <p:nvPr/>
-        </p:nvSpPr>
-        <p:spPr>
-          <a:xfrm>
-            <a:off x="156696" y="108401"/>
-            <a:ext cx="5142375" cy="461665"/>
+          <p:cNvPr id="1265" name="正方形/長方形 1264">
+            <a:extLst>
+              <a:ext uri="{FF2B5EF4-FFF2-40B4-BE49-F238E27FC236}">
+                <a16:creationId xmlns:a16="http://schemas.microsoft.com/office/drawing/2014/main" id="{065D2429-D342-4B89-95CB-FD1B6C06A911}"/>
+              </a:ext>
+            </a:extLst>
+          </p:cNvPr>
+          <p:cNvSpPr/>
+          <p:nvPr/>
+        </p:nvSpPr>
+        <p:spPr>
+          <a:xfrm>
+            <a:off x="9984161" y="121978"/>
+            <a:ext cx="2090179" cy="691035"/>
           </a:xfrm>
           <a:prstGeom prst="rect">
             <a:avLst/>
           </a:prstGeom>
           <a:noFill/>
-        </p:spPr>
-        <p:txBody>
-          <a:bodyPr wrap="square">
-            <a:spAutoFit/>
-          </a:bodyPr>
-          <a:lstStyle/>
-          <a:p>
-            <a:r>
-              <a:rPr kumimoji="1" lang="en-US" altLang="ja-JP" sz="2400">
-                <a:solidFill>
-                  <a:schemeClr val="bg1">
-                    <a:lumMod val="75000"/>
-                  </a:schemeClr>
-                </a:solidFill>
-              </a:rPr>
-              <a:t>Rust Memory Container Cheat-sheet</a:t>
-            </a:r>
+          <a:ln w="9525" cap="flat" cmpd="sng" algn="ctr">
+            <a:solidFill>
+              <a:srgbClr val="996633"/>
+            </a:solidFill>
+            <a:prstDash val="lgDash"/>
+            <a:round/>
+            <a:headEnd type="none" w="med" len="med"/>
+            <a:tailEnd type="none" w="med" len="med"/>
+          </a:ln>
+        </p:spPr>
+        <p:style>
+          <a:lnRef idx="0">
+            <a:scrgbClr r="0" g="0" b="0"/>
+          </a:lnRef>
+          <a:fillRef idx="0">
+            <a:scrgbClr r="0" g="0" b="0"/>
+          </a:fillRef>
+          <a:effectRef idx="0">
+            <a:scrgbClr r="0" g="0" b="0"/>
+          </a:effectRef>
+          <a:fontRef idx="minor">
+            <a:schemeClr val="dk1"/>
+          </a:fontRef>
+        </p:style>
+        <p:txBody>
+          <a:bodyPr rtlCol="0" anchor="ctr"/>
+          <a:lstStyle/>
+          <a:p>
+            <a:pPr algn="ctr"/>
+            <a:endParaRPr kumimoji="1" lang="ja-JP" altLang="en-US"/>
           </a:p>
         </p:txBody>
       </p:sp>

</xml_diff>

<commit_message>
fix #6, readme typos and rev.2 metadata updates
</commit_message>
<xml_diff>
--- a/rust-memory-container-cs.pptx
+++ b/rust-memory-container-cs.pptx
@@ -104,6 +104,11 @@
       </a:defRPr>
     </a:lvl9pPr>
   </p:defaultTextStyle>
+  <p:extLst>
+    <p:ext uri="{EFAFB233-063F-42B5-8137-9DF3F51BA10A}">
+      <p15:sldGuideLst xmlns:p15="http://schemas.microsoft.com/office/powerpoint/2012/main"/>
+    </p:ext>
+  </p:extLst>
 </p:presentation>
 </file>
 
@@ -238,7 +243,7 @@
           <a:p>
             <a:fld id="{7CC16B7A-B226-4E33-9198-9F6DB6136268}" type="datetimeFigureOut">
               <a:rPr kumimoji="1" lang="ja-JP" altLang="en-US" smtClean="0"/>
-              <a:t>2020/8/21</a:t>
+              <a:t>2020/9/24</a:t>
             </a:fld>
             <a:endParaRPr kumimoji="1" lang="ja-JP" altLang="en-US"/>
           </a:p>
@@ -440,7 +445,7 @@
           <a:p>
             <a:fld id="{7CC16B7A-B226-4E33-9198-9F6DB6136268}" type="datetimeFigureOut">
               <a:rPr kumimoji="1" lang="ja-JP" altLang="en-US" smtClean="0"/>
-              <a:t>2020/8/21</a:t>
+              <a:t>2020/9/24</a:t>
             </a:fld>
             <a:endParaRPr kumimoji="1" lang="ja-JP" altLang="en-US"/>
           </a:p>
@@ -652,7 +657,7 @@
           <a:p>
             <a:fld id="{7CC16B7A-B226-4E33-9198-9F6DB6136268}" type="datetimeFigureOut">
               <a:rPr kumimoji="1" lang="ja-JP" altLang="en-US" smtClean="0"/>
-              <a:t>2020/8/21</a:t>
+              <a:t>2020/9/24</a:t>
             </a:fld>
             <a:endParaRPr kumimoji="1" lang="ja-JP" altLang="en-US"/>
           </a:p>
@@ -854,7 +859,7 @@
           <a:p>
             <a:fld id="{7CC16B7A-B226-4E33-9198-9F6DB6136268}" type="datetimeFigureOut">
               <a:rPr kumimoji="1" lang="ja-JP" altLang="en-US" smtClean="0"/>
-              <a:t>2020/8/21</a:t>
+              <a:t>2020/9/24</a:t>
             </a:fld>
             <a:endParaRPr kumimoji="1" lang="ja-JP" altLang="en-US"/>
           </a:p>
@@ -1100,7 +1105,7 @@
           <a:p>
             <a:fld id="{7CC16B7A-B226-4E33-9198-9F6DB6136268}" type="datetimeFigureOut">
               <a:rPr kumimoji="1" lang="ja-JP" altLang="en-US" smtClean="0"/>
-              <a:t>2020/8/21</a:t>
+              <a:t>2020/9/24</a:t>
             </a:fld>
             <a:endParaRPr kumimoji="1" lang="ja-JP" altLang="en-US"/>
           </a:p>
@@ -1396,7 +1401,7 @@
           <a:p>
             <a:fld id="{7CC16B7A-B226-4E33-9198-9F6DB6136268}" type="datetimeFigureOut">
               <a:rPr kumimoji="1" lang="ja-JP" altLang="en-US" smtClean="0"/>
-              <a:t>2020/8/21</a:t>
+              <a:t>2020/9/24</a:t>
             </a:fld>
             <a:endParaRPr kumimoji="1" lang="ja-JP" altLang="en-US"/>
           </a:p>
@@ -1827,7 +1832,7 @@
           <a:p>
             <a:fld id="{7CC16B7A-B226-4E33-9198-9F6DB6136268}" type="datetimeFigureOut">
               <a:rPr kumimoji="1" lang="ja-JP" altLang="en-US" smtClean="0"/>
-              <a:t>2020/8/21</a:t>
+              <a:t>2020/9/24</a:t>
             </a:fld>
             <a:endParaRPr kumimoji="1" lang="ja-JP" altLang="en-US"/>
           </a:p>
@@ -1945,7 +1950,7 @@
           <a:p>
             <a:fld id="{7CC16B7A-B226-4E33-9198-9F6DB6136268}" type="datetimeFigureOut">
               <a:rPr kumimoji="1" lang="ja-JP" altLang="en-US" smtClean="0"/>
-              <a:t>2020/8/21</a:t>
+              <a:t>2020/9/24</a:t>
             </a:fld>
             <a:endParaRPr kumimoji="1" lang="ja-JP" altLang="en-US"/>
           </a:p>
@@ -2040,7 +2045,7 @@
           <a:p>
             <a:fld id="{7CC16B7A-B226-4E33-9198-9F6DB6136268}" type="datetimeFigureOut">
               <a:rPr kumimoji="1" lang="ja-JP" altLang="en-US" smtClean="0"/>
-              <a:t>2020/8/21</a:t>
+              <a:t>2020/9/24</a:t>
             </a:fld>
             <a:endParaRPr kumimoji="1" lang="ja-JP" altLang="en-US"/>
           </a:p>
@@ -2349,7 +2354,7 @@
           <a:p>
             <a:fld id="{7CC16B7A-B226-4E33-9198-9F6DB6136268}" type="datetimeFigureOut">
               <a:rPr kumimoji="1" lang="ja-JP" altLang="en-US" smtClean="0"/>
-              <a:t>2020/8/21</a:t>
+              <a:t>2020/9/24</a:t>
             </a:fld>
             <a:endParaRPr kumimoji="1" lang="ja-JP" altLang="en-US"/>
           </a:p>
@@ -2606,7 +2611,7 @@
           <a:p>
             <a:fld id="{7CC16B7A-B226-4E33-9198-9F6DB6136268}" type="datetimeFigureOut">
               <a:rPr kumimoji="1" lang="ja-JP" altLang="en-US" smtClean="0"/>
-              <a:t>2020/8/21</a:t>
+              <a:t>2020/9/24</a:t>
             </a:fld>
             <a:endParaRPr kumimoji="1" lang="ja-JP" altLang="en-US"/>
           </a:p>
@@ -2851,7 +2856,7 @@
           <a:p>
             <a:fld id="{7CC16B7A-B226-4E33-9198-9F6DB6136268}" type="datetimeFigureOut">
               <a:rPr kumimoji="1" lang="ja-JP" altLang="en-US" smtClean="0"/>
-              <a:t>2020/8/21</a:t>
+              <a:t>2020/9/24</a:t>
             </a:fld>
             <a:endParaRPr kumimoji="1" lang="ja-JP" altLang="en-US"/>
           </a:p>
@@ -3407,7 +3412,7 @@
                   <a:srgbClr val="818181"/>
                 </a:solidFill>
               </a:rPr>
-              <a:t>rev.1; 2020-08-22</a:t>
+              <a:t>rev.2; 2020-09-24</a:t>
             </a:r>
           </a:p>
           <a:p>
@@ -3602,6 +3607,14 @@
               </a:rPr>
               <a:t>&gt;</a:t>
             </a:r>
+            <a:r>
+              <a:rPr kumimoji="1" lang="en-US" altLang="ja-JP" baseline="30000">
+                <a:solidFill>
+                  <a:srgbClr val="818181"/>
+                </a:solidFill>
+              </a:rPr>
+              <a:t> (†3)</a:t>
+            </a:r>
             <a:endParaRPr kumimoji="1" lang="ja-JP" altLang="en-US">
               <a:solidFill>
                 <a:srgbClr val="00B0F0"/>
@@ -3670,6 +3683,14 @@
               </a:rPr>
               <a:t>&gt;</a:t>
             </a:r>
+            <a:r>
+              <a:rPr kumimoji="1" lang="en-US" altLang="ja-JP" baseline="30000">
+                <a:solidFill>
+                  <a:srgbClr val="818181"/>
+                </a:solidFill>
+              </a:rPr>
+              <a:t> (†3)</a:t>
+            </a:r>
             <a:endParaRPr kumimoji="1" lang="ja-JP" altLang="en-US">
               <a:solidFill>
                 <a:srgbClr val="00B0F0"/>
@@ -3998,6 +4019,14 @@
               </a:rPr>
               <a:t>&gt;&gt;</a:t>
             </a:r>
+            <a:r>
+              <a:rPr kumimoji="1" lang="en-US" altLang="ja-JP" baseline="30000">
+                <a:solidFill>
+                  <a:srgbClr val="818181"/>
+                </a:solidFill>
+              </a:rPr>
+              <a:t> (†3)</a:t>
+            </a:r>
             <a:endParaRPr kumimoji="1" lang="ja-JP" altLang="en-US">
               <a:solidFill>
                 <a:srgbClr val="00B0F0"/>
@@ -4081,6 +4110,14 @@
                 </a:solidFill>
               </a:rPr>
               <a:t>&gt;&gt;</a:t>
+            </a:r>
+            <a:r>
+              <a:rPr kumimoji="1" lang="en-US" altLang="ja-JP" baseline="30000">
+                <a:solidFill>
+                  <a:srgbClr val="818181"/>
+                </a:solidFill>
+              </a:rPr>
+              <a:t> (†3)</a:t>
             </a:r>
             <a:endParaRPr kumimoji="1" lang="ja-JP" altLang="en-US">
               <a:solidFill>
@@ -6785,7 +6822,7 @@
         <p:spPr>
           <a:xfrm>
             <a:off x="8590464" y="3126903"/>
-            <a:ext cx="1356910" cy="369332"/>
+            <a:ext cx="1513941" cy="369332"/>
           </a:xfrm>
           <a:prstGeom prst="rect">
             <a:avLst/>
@@ -6806,7 +6843,7 @@
                   <a:schemeClr val="accent1"/>
                 </a:solidFill>
               </a:rPr>
-              <a:t>&lt;Copy-able&gt;</a:t>
+              <a:t>&lt;Copy|move&gt;</a:t>
             </a:r>
             <a:endParaRPr kumimoji="1" lang="ja-JP" altLang="en-US">
               <a:solidFill>
@@ -6831,7 +6868,7 @@
         <p:spPr>
           <a:xfrm>
             <a:off x="8590464" y="3519257"/>
-            <a:ext cx="747833" cy="369332"/>
+            <a:ext cx="1523750" cy="369332"/>
           </a:xfrm>
           <a:prstGeom prst="rect">
             <a:avLst/>
@@ -6854,7 +6891,7 @@
                   </a:schemeClr>
                 </a:solidFill>
               </a:rPr>
-              <a:t>&lt;any&gt;</a:t>
+              <a:t>&lt;&amp; reference&gt;</a:t>
             </a:r>
             <a:endParaRPr kumimoji="1" lang="ja-JP" altLang="en-US">
               <a:solidFill>
@@ -7138,7 +7175,7 @@
         <p:spPr>
           <a:xfrm>
             <a:off x="8590464" y="1567121"/>
-            <a:ext cx="1356910" cy="369332"/>
+            <a:ext cx="1513941" cy="369332"/>
           </a:xfrm>
           <a:prstGeom prst="rect">
             <a:avLst/>
@@ -7159,7 +7196,7 @@
                   <a:schemeClr val="accent1"/>
                 </a:solidFill>
               </a:rPr>
-              <a:t>&lt;Copy-able&gt;</a:t>
+              <a:t>&lt;Copy|move&gt;</a:t>
             </a:r>
             <a:endParaRPr kumimoji="1" lang="ja-JP" altLang="en-US">
               <a:solidFill>
@@ -7184,7 +7221,7 @@
         <p:spPr>
           <a:xfrm>
             <a:off x="8590464" y="1933655"/>
-            <a:ext cx="747833" cy="369332"/>
+            <a:ext cx="1523750" cy="369332"/>
           </a:xfrm>
           <a:prstGeom prst="rect">
             <a:avLst/>
@@ -7207,7 +7244,7 @@
                   </a:schemeClr>
                 </a:solidFill>
               </a:rPr>
-              <a:t>&lt;any&gt;</a:t>
+              <a:t>&lt;&amp; reference&gt;</a:t>
             </a:r>
             <a:endParaRPr kumimoji="1" lang="ja-JP" altLang="en-US">
               <a:solidFill>
@@ -7657,7 +7694,7 @@
         <p:spPr>
           <a:xfrm>
             <a:off x="6196034" y="22243"/>
-            <a:ext cx="2317204" cy="1323439"/>
+            <a:ext cx="2317204" cy="707886"/>
           </a:xfrm>
           <a:prstGeom prst="rect">
             <a:avLst/>
@@ -7725,87 +7762,6 @@
                 </a:solidFill>
               </a:rPr>
               <a:t> x: T` for your binding if it needs mutability”.</a:t>
-            </a:r>
-          </a:p>
-          <a:p>
-            <a:endParaRPr kumimoji="1" lang="en-US" altLang="ja-JP" sz="1000">
-              <a:solidFill>
-                <a:srgbClr val="818181"/>
-              </a:solidFill>
-            </a:endParaRPr>
-          </a:p>
-          <a:p>
-            <a:r>
-              <a:rPr kumimoji="1" lang="en-US" altLang="ja-JP" sz="1000">
-                <a:solidFill>
-                  <a:srgbClr val="818181"/>
-                </a:solidFill>
-              </a:rPr>
-              <a:t>(†2): `</a:t>
-            </a:r>
-            <a:r>
-              <a:rPr kumimoji="1" lang="en-US" altLang="ja-JP" sz="1000" err="1">
-                <a:solidFill>
-                  <a:srgbClr val="818181"/>
-                </a:solidFill>
-              </a:rPr>
-              <a:t>bool|int</a:t>
-            </a:r>
-            <a:r>
-              <a:rPr kumimoji="1" lang="en-US" altLang="ja-JP" sz="1000">
-                <a:solidFill>
-                  <a:srgbClr val="818181"/>
-                </a:solidFill>
-              </a:rPr>
-              <a:t>` means to “Boolean or Integral” that is Bool, I8, I16, I32, I64, </a:t>
-            </a:r>
-            <a:r>
-              <a:rPr kumimoji="1" lang="en-US" altLang="ja-JP" sz="1000" err="1">
-                <a:solidFill>
-                  <a:srgbClr val="818181"/>
-                </a:solidFill>
-              </a:rPr>
-              <a:t>Isize</a:t>
-            </a:r>
-            <a:r>
-              <a:rPr kumimoji="1" lang="en-US" altLang="ja-JP" sz="1000">
-                <a:solidFill>
-                  <a:srgbClr val="818181"/>
-                </a:solidFill>
-              </a:rPr>
-              <a:t>, U8, U16, U32, U64, </a:t>
-            </a:r>
-            <a:r>
-              <a:rPr kumimoji="1" lang="en-US" altLang="ja-JP" sz="1000" err="1">
-                <a:solidFill>
-                  <a:srgbClr val="818181"/>
-                </a:solidFill>
-              </a:rPr>
-              <a:t>Usize</a:t>
-            </a:r>
-            <a:r>
-              <a:rPr kumimoji="1" lang="en-US" altLang="ja-JP" sz="1000">
-                <a:solidFill>
-                  <a:srgbClr val="818181"/>
-                </a:solidFill>
-              </a:rPr>
-              <a:t> and </a:t>
-            </a:r>
-            <a:r>
-              <a:rPr kumimoji="1" lang="en-US" altLang="ja-JP" sz="1000" err="1">
-                <a:solidFill>
-                  <a:srgbClr val="818181"/>
-                </a:solidFill>
-              </a:rPr>
-              <a:t>Ptr</a:t>
-            </a:r>
-            <a:r>
-              <a:rPr kumimoji="1" lang="en-US" altLang="ja-JP" sz="1000">
-                <a:solidFill>
-                  <a:srgbClr val="818181"/>
-                </a:solidFill>
-              </a:rPr>
-              <a:t>.</a:t>
             </a:r>
           </a:p>
         </p:txBody>
@@ -8335,6 +8291,148 @@
           <a:p>
             <a:pPr algn="ctr"/>
             <a:endParaRPr kumimoji="1" lang="ja-JP" altLang="en-US"/>
+          </a:p>
+        </p:txBody>
+      </p:sp>
+      <p:sp>
+        <p:nvSpPr>
+          <p:cNvPr id="3" name="テキスト ボックス 2">
+            <a:extLst>
+              <a:ext uri="{FF2B5EF4-FFF2-40B4-BE49-F238E27FC236}">
+                <a16:creationId xmlns:a16="http://schemas.microsoft.com/office/drawing/2014/main" id="{C618D43E-647F-415F-A1AA-0D5E7BC92516}"/>
+              </a:ext>
+            </a:extLst>
+          </p:cNvPr>
+          <p:cNvSpPr txBox="1"/>
+          <p:nvPr/>
+        </p:nvSpPr>
+        <p:spPr>
+          <a:xfrm>
+            <a:off x="3783368" y="532802"/>
+            <a:ext cx="2317204" cy="707886"/>
+          </a:xfrm>
+          <a:prstGeom prst="rect">
+            <a:avLst/>
+          </a:prstGeom>
+          <a:noFill/>
+        </p:spPr>
+        <p:txBody>
+          <a:bodyPr wrap="square">
+            <a:spAutoFit/>
+          </a:bodyPr>
+          <a:lstStyle/>
+          <a:p>
+            <a:r>
+              <a:rPr kumimoji="1" lang="en-US" altLang="ja-JP" sz="1000">
+                <a:solidFill>
+                  <a:srgbClr val="818181"/>
+                </a:solidFill>
+              </a:rPr>
+              <a:t>(†3): Choose `RefCell` if you want plain `&amp;` references to the contained data. On the other hand, `Cell` will need `Copy` or `.replace` and move operations.</a:t>
+            </a:r>
+          </a:p>
+        </p:txBody>
+      </p:sp>
+      <p:sp>
+        <p:nvSpPr>
+          <p:cNvPr id="6" name="テキスト ボックス 5">
+            <a:extLst>
+              <a:ext uri="{FF2B5EF4-FFF2-40B4-BE49-F238E27FC236}">
+                <a16:creationId xmlns:a16="http://schemas.microsoft.com/office/drawing/2014/main" id="{6F09AA8F-323A-4153-A074-C458B7427366}"/>
+              </a:ext>
+            </a:extLst>
+          </p:cNvPr>
+          <p:cNvSpPr txBox="1"/>
+          <p:nvPr/>
+        </p:nvSpPr>
+        <p:spPr>
+          <a:xfrm>
+            <a:off x="6196033" y="708406"/>
+            <a:ext cx="2317204" cy="553998"/>
+          </a:xfrm>
+          <a:prstGeom prst="rect">
+            <a:avLst/>
+          </a:prstGeom>
+          <a:noFill/>
+        </p:spPr>
+        <p:txBody>
+          <a:bodyPr wrap="square">
+            <a:spAutoFit/>
+          </a:bodyPr>
+          <a:lstStyle/>
+          <a:p>
+            <a:r>
+              <a:rPr kumimoji="1" lang="en-US" altLang="ja-JP" sz="1000">
+                <a:solidFill>
+                  <a:srgbClr val="818181"/>
+                </a:solidFill>
+              </a:rPr>
+              <a:t>(†2): `</a:t>
+            </a:r>
+            <a:r>
+              <a:rPr kumimoji="1" lang="en-US" altLang="ja-JP" sz="1000" err="1">
+                <a:solidFill>
+                  <a:srgbClr val="818181"/>
+                </a:solidFill>
+              </a:rPr>
+              <a:t>bool|int</a:t>
+            </a:r>
+            <a:r>
+              <a:rPr kumimoji="1" lang="en-US" altLang="ja-JP" sz="1000">
+                <a:solidFill>
+                  <a:srgbClr val="818181"/>
+                </a:solidFill>
+              </a:rPr>
+              <a:t>` means to “Boolean or Integral” that is Bool, I8, I16, I32, I64, </a:t>
+            </a:r>
+            <a:r>
+              <a:rPr kumimoji="1" lang="en-US" altLang="ja-JP" sz="1000" err="1">
+                <a:solidFill>
+                  <a:srgbClr val="818181"/>
+                </a:solidFill>
+              </a:rPr>
+              <a:t>Isize</a:t>
+            </a:r>
+            <a:r>
+              <a:rPr kumimoji="1" lang="en-US" altLang="ja-JP" sz="1000">
+                <a:solidFill>
+                  <a:srgbClr val="818181"/>
+                </a:solidFill>
+              </a:rPr>
+              <a:t>, U8, U16, U32, U64, </a:t>
+            </a:r>
+            <a:r>
+              <a:rPr kumimoji="1" lang="en-US" altLang="ja-JP" sz="1000" err="1">
+                <a:solidFill>
+                  <a:srgbClr val="818181"/>
+                </a:solidFill>
+              </a:rPr>
+              <a:t>Usize</a:t>
+            </a:r>
+            <a:r>
+              <a:rPr kumimoji="1" lang="en-US" altLang="ja-JP" sz="1000">
+                <a:solidFill>
+                  <a:srgbClr val="818181"/>
+                </a:solidFill>
+              </a:rPr>
+              <a:t> and </a:t>
+            </a:r>
+            <a:r>
+              <a:rPr kumimoji="1" lang="en-US" altLang="ja-JP" sz="1000" err="1">
+                <a:solidFill>
+                  <a:srgbClr val="818181"/>
+                </a:solidFill>
+              </a:rPr>
+              <a:t>Ptr</a:t>
+            </a:r>
+            <a:r>
+              <a:rPr kumimoji="1" lang="en-US" altLang="ja-JP" sz="1000">
+                <a:solidFill>
+                  <a:srgbClr val="818181"/>
+                </a:solidFill>
+              </a:rPr>
+              <a:t>.</a:t>
+            </a:r>
           </a:p>
         </p:txBody>
       </p:sp>

</xml_diff>